<commit_message>
updated data & formatting
</commit_message>
<xml_diff>
--- a/data/15-gene_networks_analysis/Five-Networks_Bar-Chart-Analysis_BK20161116.pptx
+++ b/data/15-gene_networks_analysis/Five-Networks_Bar-Chart-Analysis_BK20161116.pptx
@@ -131,17 +131,7 @@
   <c:chart>
     <c:autoTitleDeleted val="0"/>
     <c:plotArea>
-      <c:layout>
-        <c:manualLayout>
-          <c:layoutTarget val="inner"/>
-          <c:xMode val="edge"/>
-          <c:yMode val="edge"/>
-          <c:x val="0.0443221136302686"/>
-          <c:y val="0.0296478744754607"/>
-          <c:w val="0.846997344553036"/>
-          <c:h val="0.86573607178413"/>
-        </c:manualLayout>
-      </c:layout>
+      <c:layout/>
       <c:barChart>
         <c:barDir val="col"/>
         <c:grouping val="clustered"/>
@@ -151,7 +141,7 @@
           <c:order val="0"/>
           <c:tx>
             <c:strRef>
-              <c:f>production_rate!$B$1</c:f>
+              <c:f>optimized_production_rates!$B$1</c:f>
               <c:strCache>
                 <c:ptCount val="1"/>
                 <c:pt idx="0">
@@ -163,7 +153,7 @@
           <c:invertIfNegative val="0"/>
           <c:cat>
             <c:strRef>
-              <c:f>production_rate!$A$2:$A$28</c:f>
+              <c:f>optimized_production_rates!$A$2:$A$28</c:f>
               <c:strCache>
                 <c:ptCount val="27"/>
                 <c:pt idx="0">
@@ -252,57 +242,57 @@
           </c:cat>
           <c:val>
             <c:numRef>
-              <c:f>production_rate!$B$2:$B$28</c:f>
+              <c:f>optimized_production_rates!$B$2:$B$28</c:f>
               <c:numCache>
-                <c:formatCode>0.0000</c:formatCode>
+                <c:formatCode>General</c:formatCode>
                 <c:ptCount val="27"/>
                 <c:pt idx="0">
-                  <c:v>0.0575920958755257</c:v>
+                  <c:v>0.0575913822521516</c:v>
                 </c:pt>
                 <c:pt idx="1">
-                  <c:v>0.133678811770889</c:v>
+                  <c:v>0.133860770519951</c:v>
                 </c:pt>
                 <c:pt idx="2">
-                  <c:v>0.290002185491314</c:v>
+                  <c:v>0.290004958317571</c:v>
                 </c:pt>
                 <c:pt idx="3">
-                  <c:v>0.158209206282842</c:v>
+                  <c:v>0.158179714638895</c:v>
                 </c:pt>
                 <c:pt idx="4">
-                  <c:v>1.532022808949425</c:v>
+                  <c:v>1.529886194369607</c:v>
                 </c:pt>
                 <c:pt idx="5">
-                  <c:v>1.15295050359556</c:v>
+                  <c:v>1.152815987887547</c:v>
                 </c:pt>
                 <c:pt idx="8">
-                  <c:v>0.181089143057497</c:v>
+                  <c:v>0.181216029006856</c:v>
                 </c:pt>
                 <c:pt idx="10">
-                  <c:v>0.360153016349474</c:v>
+                  <c:v>0.360109759485015</c:v>
                 </c:pt>
                 <c:pt idx="11">
-                  <c:v>2.341431829237134</c:v>
+                  <c:v>2.344771437217852</c:v>
                 </c:pt>
                 <c:pt idx="12">
-                  <c:v>0.482873882176685</c:v>
+                  <c:v>0.483290667170217</c:v>
                 </c:pt>
                 <c:pt idx="16">
-                  <c:v>0.575100348745167</c:v>
+                  <c:v>0.573852541980063</c:v>
                 </c:pt>
                 <c:pt idx="19">
-                  <c:v>1.006810169728769</c:v>
+                  <c:v>1.0066312765505</c:v>
                 </c:pt>
                 <c:pt idx="21">
-                  <c:v>0.227973093542632</c:v>
+                  <c:v>0.227818344361106</c:v>
                 </c:pt>
                 <c:pt idx="24">
-                  <c:v>0.151277932654762</c:v>
+                  <c:v>0.151302376140514</c:v>
                 </c:pt>
                 <c:pt idx="25">
-                  <c:v>0.785443896324245</c:v>
+                  <c:v>0.785593453477971</c:v>
                 </c:pt>
                 <c:pt idx="26">
-                  <c:v>0.126534470191938</c:v>
+                  <c:v>0.126533469890166</c:v>
                 </c:pt>
               </c:numCache>
             </c:numRef>
@@ -313,11 +303,11 @@
           <c:order val="1"/>
           <c:tx>
             <c:strRef>
-              <c:f>production_rate!$C$1</c:f>
+              <c:f>optimized_production_rates!$C$1</c:f>
               <c:strCache>
                 <c:ptCount val="1"/>
                 <c:pt idx="0">
-                  <c:v>17 gene dCIN5</c:v>
+                  <c:v>CIN5 (14 Genes)</c:v>
                 </c:pt>
               </c:strCache>
             </c:strRef>
@@ -325,7 +315,7 @@
           <c:invertIfNegative val="0"/>
           <c:cat>
             <c:strRef>
-              <c:f>production_rate!$A$2:$A$28</c:f>
+              <c:f>optimized_production_rates!$A$2:$A$28</c:f>
               <c:strCache>
                 <c:ptCount val="27"/>
                 <c:pt idx="0">
@@ -414,60 +404,51 @@
           </c:cat>
           <c:val>
             <c:numRef>
-              <c:f>production_rate!$C$2:$C$28</c:f>
+              <c:f>optimized_production_rates!$C$2:$C$28</c:f>
               <c:numCache>
-                <c:formatCode>0.0000</c:formatCode>
+                <c:formatCode>General</c:formatCode>
                 <c:ptCount val="27"/>
-                <c:pt idx="1">
-                  <c:v>0.223295</c:v>
-                </c:pt>
                 <c:pt idx="5">
-                  <c:v>0.846375</c:v>
+                  <c:v>1.579163579398172</c:v>
                 </c:pt>
                 <c:pt idx="9">
-                  <c:v>0.232776815974584</c:v>
+                  <c:v>0.225272266318016</c:v>
                 </c:pt>
                 <c:pt idx="10">
-                  <c:v>0.288887594962669</c:v>
+                  <c:v>0.417362842583617</c:v>
                 </c:pt>
                 <c:pt idx="11">
-                  <c:v>1.271103160927129</c:v>
+                  <c:v>1.07963771087577</c:v>
                 </c:pt>
                 <c:pt idx="12">
-                  <c:v>0.545892922619087</c:v>
-                </c:pt>
-                <c:pt idx="14">
-                  <c:v>0.144253454393078</c:v>
+                  <c:v>0.512220568080633</c:v>
                 </c:pt>
                 <c:pt idx="15">
-                  <c:v>0.267409598030602</c:v>
+                  <c:v>0.272480476257762</c:v>
                 </c:pt>
                 <c:pt idx="16">
-                  <c:v>2.610910744833262</c:v>
+                  <c:v>2.182960001713384</c:v>
                 </c:pt>
                 <c:pt idx="18">
-                  <c:v>0.199580066058165</c:v>
+                  <c:v>0.295828424167885</c:v>
                 </c:pt>
                 <c:pt idx="19">
-                  <c:v>0.58640787835643</c:v>
+                  <c:v>1.410076454034166</c:v>
                 </c:pt>
                 <c:pt idx="20">
-                  <c:v>0.247103713073766</c:v>
+                  <c:v>0.601204379101917</c:v>
                 </c:pt>
                 <c:pt idx="21">
-                  <c:v>0.275820163764373</c:v>
+                  <c:v>0.335473197660211</c:v>
                 </c:pt>
                 <c:pt idx="22">
-                  <c:v>0.818282040925328</c:v>
+                  <c:v>1.139993753009473</c:v>
                 </c:pt>
                 <c:pt idx="24">
-                  <c:v>0.746247554376721</c:v>
+                  <c:v>1.882566711793038</c:v>
                 </c:pt>
                 <c:pt idx="25">
-                  <c:v>1.114124926307391</c:v>
-                </c:pt>
-                <c:pt idx="26">
-                  <c:v>0.132194425331235</c:v>
+                  <c:v>1.366806469059578</c:v>
                 </c:pt>
               </c:numCache>
             </c:numRef>
@@ -478,11 +459,11 @@
           <c:order val="2"/>
           <c:tx>
             <c:strRef>
-              <c:f>production_rate!$D$1</c:f>
+              <c:f>optimized_production_rates!$D$1</c:f>
               <c:strCache>
                 <c:ptCount val="1"/>
                 <c:pt idx="0">
-                  <c:v>14 gene dCIN5</c:v>
+                  <c:v>CIN5 (17 Genes)</c:v>
                 </c:pt>
               </c:strCache>
             </c:strRef>
@@ -490,7 +471,7 @@
           <c:invertIfNegative val="0"/>
           <c:cat>
             <c:strRef>
-              <c:f>production_rate!$A$2:$A$28</c:f>
+              <c:f>optimized_production_rates!$A$2:$A$28</c:f>
               <c:strCache>
                 <c:ptCount val="27"/>
                 <c:pt idx="0">
@@ -579,51 +560,60 @@
           </c:cat>
           <c:val>
             <c:numRef>
-              <c:f>production_rate!$D$2:$D$28</c:f>
+              <c:f>optimized_production_rates!$D$2:$D$28</c:f>
               <c:numCache>
-                <c:formatCode>0.0000</c:formatCode>
+                <c:formatCode>General</c:formatCode>
                 <c:ptCount val="27"/>
+                <c:pt idx="1">
+                  <c:v>0.223295285947394</c:v>
+                </c:pt>
                 <c:pt idx="5">
-                  <c:v>1.579164</c:v>
+                  <c:v>0.846374595966167</c:v>
                 </c:pt>
                 <c:pt idx="9">
-                  <c:v>0.225272</c:v>
+                  <c:v>0.232776815974584</c:v>
                 </c:pt>
                 <c:pt idx="10">
-                  <c:v>0.417362842583617</c:v>
+                  <c:v>0.288887594962669</c:v>
                 </c:pt>
                 <c:pt idx="11">
-                  <c:v>1.07963771087577</c:v>
+                  <c:v>1.271103160927129</c:v>
                 </c:pt>
                 <c:pt idx="12">
-                  <c:v>0.512220568080633</c:v>
+                  <c:v>0.545892922619087</c:v>
+                </c:pt>
+                <c:pt idx="14">
+                  <c:v>0.144253454393078</c:v>
                 </c:pt>
                 <c:pt idx="15">
-                  <c:v>0.272480476257762</c:v>
+                  <c:v>0.267409598030602</c:v>
                 </c:pt>
                 <c:pt idx="16">
-                  <c:v>2.182960001713384</c:v>
+                  <c:v>2.610910744833262</c:v>
                 </c:pt>
                 <c:pt idx="18">
-                  <c:v>0.295828424167885</c:v>
+                  <c:v>0.199580066058165</c:v>
                 </c:pt>
                 <c:pt idx="19">
-                  <c:v>1.410076454034166</c:v>
+                  <c:v>0.58640787835643</c:v>
                 </c:pt>
                 <c:pt idx="20">
-                  <c:v>0.601204379101917</c:v>
+                  <c:v>0.247103713073766</c:v>
                 </c:pt>
                 <c:pt idx="21">
-                  <c:v>0.335473197660211</c:v>
+                  <c:v>0.275820163764373</c:v>
                 </c:pt>
                 <c:pt idx="22">
-                  <c:v>1.139993753009473</c:v>
+                  <c:v>0.818282040925328</c:v>
                 </c:pt>
                 <c:pt idx="24">
-                  <c:v>1.882566711793038</c:v>
+                  <c:v>0.746247554376721</c:v>
                 </c:pt>
                 <c:pt idx="25">
-                  <c:v>1.366806469059578</c:v>
+                  <c:v>1.114124926307391</c:v>
+                </c:pt>
+                <c:pt idx="26">
+                  <c:v>0.132194425331235</c:v>
                 </c:pt>
               </c:numCache>
             </c:numRef>
@@ -634,11 +624,11 @@
           <c:order val="3"/>
           <c:tx>
             <c:strRef>
-              <c:f>production_rate!$E$1</c:f>
+              <c:f>optimized_production_rates!$E$1</c:f>
               <c:strCache>
                 <c:ptCount val="1"/>
                 <c:pt idx="0">
-                  <c:v>dGLN3</c:v>
+                  <c:v>GLN3</c:v>
                 </c:pt>
               </c:strCache>
             </c:strRef>
@@ -646,7 +636,7 @@
           <c:invertIfNegative val="0"/>
           <c:cat>
             <c:strRef>
-              <c:f>production_rate!$A$2:$A$28</c:f>
+              <c:f>optimized_production_rates!$A$2:$A$28</c:f>
               <c:strCache>
                 <c:ptCount val="27"/>
                 <c:pt idx="0">
@@ -735,18 +725,18 @@
           </c:cat>
           <c:val>
             <c:numRef>
-              <c:f>production_rate!$E$2:$E$28</c:f>
+              <c:f>optimized_production_rates!$E$2:$E$28</c:f>
               <c:numCache>
-                <c:formatCode>0.0000</c:formatCode>
+                <c:formatCode>General</c:formatCode>
                 <c:ptCount val="27"/>
                 <c:pt idx="5">
-                  <c:v>1.271004</c:v>
+                  <c:v>1.271003641243315</c:v>
                 </c:pt>
                 <c:pt idx="7">
-                  <c:v>0.160846</c:v>
+                  <c:v>0.160845843960781</c:v>
                 </c:pt>
                 <c:pt idx="9">
-                  <c:v>0.22037</c:v>
+                  <c:v>0.220370374954671</c:v>
                 </c:pt>
                 <c:pt idx="10">
                   <c:v>0.284477580466366</c:v>
@@ -790,11 +780,11 @@
           <c:order val="4"/>
           <c:tx>
             <c:strRef>
-              <c:f>production_rate!$F$1</c:f>
+              <c:f>optimized_production_rates!$F$1</c:f>
               <c:strCache>
                 <c:ptCount val="1"/>
                 <c:pt idx="0">
-                  <c:v>dHAP4</c:v>
+                  <c:v>HAP4</c:v>
                 </c:pt>
               </c:strCache>
             </c:strRef>
@@ -802,7 +792,7 @@
           <c:invertIfNegative val="0"/>
           <c:cat>
             <c:strRef>
-              <c:f>production_rate!$A$2:$A$28</c:f>
+              <c:f>optimized_production_rates!$A$2:$A$28</c:f>
               <c:strCache>
                 <c:ptCount val="27"/>
                 <c:pt idx="0">
@@ -891,9 +881,9 @@
           </c:cat>
           <c:val>
             <c:numRef>
-              <c:f>production_rate!$F$2:$F$28</c:f>
+              <c:f>optimized_production_rates!$F$2:$F$28</c:f>
               <c:numCache>
-                <c:formatCode>0.0000</c:formatCode>
+                <c:formatCode>General</c:formatCode>
                 <c:ptCount val="27"/>
                 <c:pt idx="1">
                   <c:v>0.16323432499927</c:v>
@@ -949,11 +939,11 @@
           <c:order val="5"/>
           <c:tx>
             <c:strRef>
-              <c:f>production_rate!$G$1</c:f>
+              <c:f>optimized_production_rates!$G$1</c:f>
               <c:strCache>
                 <c:ptCount val="1"/>
                 <c:pt idx="0">
-                  <c:v>dZAP1</c:v>
+                  <c:v>ZAP1</c:v>
                 </c:pt>
               </c:strCache>
             </c:strRef>
@@ -961,7 +951,7 @@
           <c:invertIfNegative val="0"/>
           <c:cat>
             <c:strRef>
-              <c:f>production_rate!$A$2:$A$28</c:f>
+              <c:f>optimized_production_rates!$A$2:$A$28</c:f>
               <c:strCache>
                 <c:ptCount val="27"/>
                 <c:pt idx="0">
@@ -1050,9 +1040,9 @@
           </c:cat>
           <c:val>
             <c:numRef>
-              <c:f>production_rate!$G$2:$G$28</c:f>
+              <c:f>optimized_production_rates!$G$2:$G$28</c:f>
               <c:numCache>
-                <c:formatCode>0.0000</c:formatCode>
+                <c:formatCode>General</c:formatCode>
                 <c:ptCount val="27"/>
                 <c:pt idx="0">
                   <c:v>0.0575658901947018</c:v>
@@ -1115,11 +1105,11 @@
           <c:showBubbleSize val="0"/>
         </c:dLbls>
         <c:gapWidth val="150"/>
-        <c:axId val="2139783896"/>
-        <c:axId val="2142861368"/>
+        <c:axId val="-2099885720"/>
+        <c:axId val="-2053516760"/>
       </c:barChart>
       <c:catAx>
-        <c:axId val="2139783896"/>
+        <c:axId val="-2099885720"/>
         <c:scaling>
           <c:orientation val="minMax"/>
         </c:scaling>
@@ -1128,7 +1118,7 @@
         <c:majorTickMark val="out"/>
         <c:minorTickMark val="none"/>
         <c:tickLblPos val="nextTo"/>
-        <c:crossAx val="2142861368"/>
+        <c:crossAx val="-2053516760"/>
         <c:crosses val="autoZero"/>
         <c:auto val="1"/>
         <c:lblAlgn val="ctr"/>
@@ -1136,34 +1126,25 @@
         <c:noMultiLvlLbl val="0"/>
       </c:catAx>
       <c:valAx>
-        <c:axId val="2142861368"/>
+        <c:axId val="-2053516760"/>
         <c:scaling>
           <c:orientation val="minMax"/>
         </c:scaling>
         <c:delete val="0"/>
         <c:axPos val="l"/>
         <c:majorGridlines/>
-        <c:numFmt formatCode="General" sourceLinked="0"/>
+        <c:numFmt formatCode="General" sourceLinked="1"/>
         <c:majorTickMark val="out"/>
         <c:minorTickMark val="none"/>
         <c:tickLblPos val="nextTo"/>
-        <c:crossAx val="2139783896"/>
+        <c:crossAx val="-2099885720"/>
         <c:crosses val="autoZero"/>
         <c:crossBetween val="between"/>
       </c:valAx>
     </c:plotArea>
     <c:legend>
       <c:legendPos val="r"/>
-      <c:layout>
-        <c:manualLayout>
-          <c:xMode val="edge"/>
-          <c:yMode val="edge"/>
-          <c:x val="0.88294424880307"/>
-          <c:y val="0.43731440897474"/>
-          <c:w val="0.11705575119693"/>
-          <c:h val="0.357992966396442"/>
-        </c:manualLayout>
-      </c:layout>
+      <c:layout/>
       <c:overlay val="0"/>
     </c:legend>
     <c:plotVisOnly val="1"/>
@@ -1175,8 +1156,9 @@
     <a:lstStyle/>
     <a:p>
       <a:pPr>
-        <a:defRPr sz="1100" b="1" i="0">
+        <a:defRPr sz="1100" b="1">
           <a:latin typeface="Arial"/>
+          <a:cs typeface="Arial"/>
         </a:defRPr>
       </a:pPr>
       <a:endParaRPr lang="en-US"/>
@@ -1204,17 +1186,7 @@
   <c:chart>
     <c:autoTitleDeleted val="0"/>
     <c:plotArea>
-      <c:layout>
-        <c:manualLayout>
-          <c:layoutTarget val="inner"/>
-          <c:xMode val="edge"/>
-          <c:yMode val="edge"/>
-          <c:x val="0.0367512029746282"/>
-          <c:y val="0.0292792792792793"/>
-          <c:w val="0.863444991251094"/>
-          <c:h val="0.941441441441441"/>
-        </c:manualLayout>
-      </c:layout>
+      <c:layout/>
       <c:barChart>
         <c:barDir val="col"/>
         <c:grouping val="clustered"/>
@@ -1224,7 +1196,7 @@
           <c:order val="0"/>
           <c:tx>
             <c:strRef>
-              <c:f>threshold_b!$B$1</c:f>
+              <c:f>optimized_threshold_b!$B$1</c:f>
               <c:strCache>
                 <c:ptCount val="1"/>
                 <c:pt idx="0">
@@ -1236,7 +1208,7 @@
           <c:invertIfNegative val="0"/>
           <c:cat>
             <c:strRef>
-              <c:f>threshold_b!$A$2:$A$28</c:f>
+              <c:f>optimized_threshold_b!$A$2:$A$28</c:f>
               <c:strCache>
                 <c:ptCount val="27"/>
                 <c:pt idx="0">
@@ -1325,57 +1297,57 @@
           </c:cat>
           <c:val>
             <c:numRef>
-              <c:f>threshold_b!$B$2:$B$28</c:f>
+              <c:f>optimized_threshold_b!$B$2:$B$28</c:f>
               <c:numCache>
-                <c:formatCode>0.0000</c:formatCode>
+                <c:formatCode>General</c:formatCode>
                 <c:ptCount val="27"/>
                 <c:pt idx="0">
-                  <c:v>0.0575920958755257</c:v>
+                  <c:v>0.0</c:v>
                 </c:pt>
                 <c:pt idx="1">
-                  <c:v>0.259690826487757</c:v>
+                  <c:v>0.262124028397082</c:v>
                 </c:pt>
                 <c:pt idx="2">
-                  <c:v>4.517293265796752</c:v>
+                  <c:v>4.51685649317481</c:v>
                 </c:pt>
                 <c:pt idx="3">
-                  <c:v>1.360183929775246</c:v>
+                  <c:v>1.358124304426071</c:v>
                 </c:pt>
                 <c:pt idx="4">
-                  <c:v>0.766136950653921</c:v>
+                  <c:v>0.76411388816063</c:v>
                 </c:pt>
                 <c:pt idx="5">
-                  <c:v>2.70039919929482</c:v>
+                  <c:v>2.697563787237376</c:v>
                 </c:pt>
                 <c:pt idx="8">
-                  <c:v>2.422031404611753</c:v>
+                  <c:v>2.422825031475718</c:v>
                 </c:pt>
                 <c:pt idx="10">
-                  <c:v>1.344246620391796</c:v>
+                  <c:v>1.344126332267894</c:v>
                 </c:pt>
                 <c:pt idx="11">
-                  <c:v>-1.74638213249447</c:v>
+                  <c:v>-1.745139746659776</c:v>
                 </c:pt>
                 <c:pt idx="12">
-                  <c:v>1.311809902754598</c:v>
+                  <c:v>1.312883162398218</c:v>
                 </c:pt>
                 <c:pt idx="16">
-                  <c:v>0.899205657389107</c:v>
+                  <c:v>0.896129655577542</c:v>
                 </c:pt>
                 <c:pt idx="19">
-                  <c:v>1.243692394273542</c:v>
+                  <c:v>1.243380725593212</c:v>
                 </c:pt>
                 <c:pt idx="21">
-                  <c:v>-3.389403704371602</c:v>
+                  <c:v>-3.39406484809004</c:v>
                 </c:pt>
                 <c:pt idx="24">
-                  <c:v>0.309572451528725</c:v>
+                  <c:v>0.312823877758332</c:v>
                 </c:pt>
                 <c:pt idx="25">
-                  <c:v>2.986096968858418</c:v>
+                  <c:v>2.981617259366429</c:v>
                 </c:pt>
                 <c:pt idx="26">
-                  <c:v>0.126534470191938</c:v>
+                  <c:v>0.0</c:v>
                 </c:pt>
               </c:numCache>
             </c:numRef>
@@ -1386,11 +1358,11 @@
           <c:order val="1"/>
           <c:tx>
             <c:strRef>
-              <c:f>threshold_b!$C$1</c:f>
+              <c:f>optimized_threshold_b!$C$1</c:f>
               <c:strCache>
                 <c:ptCount val="1"/>
                 <c:pt idx="0">
-                  <c:v>17 gene dCIN5</c:v>
+                  <c:v>CIN5 (14 Genes)</c:v>
                 </c:pt>
               </c:strCache>
             </c:strRef>
@@ -1398,7 +1370,7 @@
           <c:invertIfNegative val="0"/>
           <c:cat>
             <c:strRef>
-              <c:f>threshold_b!$A$2:$A$28</c:f>
+              <c:f>optimized_threshold_b!$A$2:$A$28</c:f>
               <c:strCache>
                 <c:ptCount val="27"/>
                 <c:pt idx="0">
@@ -1487,60 +1459,51 @@
           </c:cat>
           <c:val>
             <c:numRef>
-              <c:f>threshold_b!$C$2:$C$28</c:f>
+              <c:f>optimized_threshold_b!$C$2:$C$28</c:f>
               <c:numCache>
-                <c:formatCode>0.0000</c:formatCode>
+                <c:formatCode>General</c:formatCode>
                 <c:ptCount val="27"/>
-                <c:pt idx="1">
-                  <c:v>1.495012</c:v>
-                </c:pt>
                 <c:pt idx="5">
-                  <c:v>0.375202</c:v>
+                  <c:v>-0.249977806</c:v>
                 </c:pt>
                 <c:pt idx="9">
                   <c:v>0.0</c:v>
                 </c:pt>
                 <c:pt idx="10">
-                  <c:v>0.597846209307697</c:v>
+                  <c:v>0.721971218720339</c:v>
                 </c:pt>
                 <c:pt idx="11">
-                  <c:v>3.129952440484738</c:v>
+                  <c:v>2.178153085800432</c:v>
                 </c:pt>
                 <c:pt idx="12">
-                  <c:v>1.887730329811488</c:v>
-                </c:pt>
-                <c:pt idx="14">
-                  <c:v>0.206092752620434</c:v>
+                  <c:v>1.732411842467356</c:v>
                 </c:pt>
                 <c:pt idx="15">
-                  <c:v>-0.0326573613113047</c:v>
+                  <c:v>-0.0251654983317954</c:v>
                 </c:pt>
                 <c:pt idx="16">
-                  <c:v>-1.802447768591495</c:v>
+                  <c:v>-1.407545747853095</c:v>
                 </c:pt>
                 <c:pt idx="18">
-                  <c:v>0.659349154383579</c:v>
+                  <c:v>1.063359759033917</c:v>
                 </c:pt>
                 <c:pt idx="19">
-                  <c:v>0.710663362870508</c:v>
+                  <c:v>-0.84878386684105</c:v>
                 </c:pt>
                 <c:pt idx="20">
-                  <c:v>0.179632115111102</c:v>
+                  <c:v>1.401357975939462</c:v>
                 </c:pt>
                 <c:pt idx="21">
-                  <c:v>-1.738883921181963</c:v>
+                  <c:v>-0.560862942853574</c:v>
                 </c:pt>
                 <c:pt idx="22">
-                  <c:v>0.124224799630721</c:v>
+                  <c:v>-0.515305996827595</c:v>
                 </c:pt>
                 <c:pt idx="24">
-                  <c:v>0.910934713872158</c:v>
+                  <c:v>-1.813471980888042</c:v>
                 </c:pt>
                 <c:pt idx="25">
-                  <c:v>0.0539253723624353</c:v>
-                </c:pt>
-                <c:pt idx="26">
-                  <c:v>0.0</c:v>
+                  <c:v>-0.227406980062209</c:v>
                 </c:pt>
               </c:numCache>
             </c:numRef>
@@ -1551,11 +1514,11 @@
           <c:order val="2"/>
           <c:tx>
             <c:strRef>
-              <c:f>threshold_b!$D$1</c:f>
+              <c:f>optimized_threshold_b!$D$1</c:f>
               <c:strCache>
                 <c:ptCount val="1"/>
                 <c:pt idx="0">
-                  <c:v>14 gene dCIN5</c:v>
+                  <c:v>CIN5 (17 Genes)</c:v>
                 </c:pt>
               </c:strCache>
             </c:strRef>
@@ -1563,7 +1526,7 @@
           <c:invertIfNegative val="0"/>
           <c:cat>
             <c:strRef>
-              <c:f>threshold_b!$A$2:$A$28</c:f>
+              <c:f>optimized_threshold_b!$A$2:$A$28</c:f>
               <c:strCache>
                 <c:ptCount val="27"/>
                 <c:pt idx="0">
@@ -1652,51 +1615,60 @@
           </c:cat>
           <c:val>
             <c:numRef>
-              <c:f>threshold_b!$D$2:$D$28</c:f>
+              <c:f>optimized_threshold_b!$D$2:$D$28</c:f>
               <c:numCache>
-                <c:formatCode>0.0000</c:formatCode>
+                <c:formatCode>General</c:formatCode>
                 <c:ptCount val="27"/>
+                <c:pt idx="1">
+                  <c:v>1.495011742689769</c:v>
+                </c:pt>
                 <c:pt idx="5">
-                  <c:v>-0.24998</c:v>
+                  <c:v>0.375201590234179</c:v>
                 </c:pt>
                 <c:pt idx="9">
                   <c:v>0.0</c:v>
                 </c:pt>
                 <c:pt idx="10">
-                  <c:v>0.721971218720339</c:v>
+                  <c:v>0.597846209307697</c:v>
                 </c:pt>
                 <c:pt idx="11">
-                  <c:v>2.178153085800432</c:v>
+                  <c:v>3.129952440484738</c:v>
                 </c:pt>
                 <c:pt idx="12">
-                  <c:v>1.732411842467356</c:v>
+                  <c:v>1.887730329811488</c:v>
                 </c:pt>
                 <c:pt idx="14">
-                  <c:v>-0.0251654983317954</c:v>
+                  <c:v>0.206092752620434</c:v>
                 </c:pt>
                 <c:pt idx="15">
-                  <c:v>-1.407545747853095</c:v>
+                  <c:v>-0.0326573613113047</c:v>
+                </c:pt>
+                <c:pt idx="16">
+                  <c:v>-1.802447768591495</c:v>
                 </c:pt>
                 <c:pt idx="18">
-                  <c:v>1.063359759033917</c:v>
+                  <c:v>0.659349154383579</c:v>
                 </c:pt>
                 <c:pt idx="19">
-                  <c:v>-0.84878386684105</c:v>
+                  <c:v>0.710663362870508</c:v>
                 </c:pt>
                 <c:pt idx="20">
-                  <c:v>1.401357975939462</c:v>
+                  <c:v>0.179632115111102</c:v>
                 </c:pt>
                 <c:pt idx="21">
-                  <c:v>-0.560862942853574</c:v>
+                  <c:v>-1.738883921181963</c:v>
                 </c:pt>
                 <c:pt idx="22">
-                  <c:v>-0.515305996827595</c:v>
+                  <c:v>0.124224799630721</c:v>
                 </c:pt>
                 <c:pt idx="24">
-                  <c:v>-1.813471980888042</c:v>
+                  <c:v>0.910934713872158</c:v>
                 </c:pt>
                 <c:pt idx="25">
-                  <c:v>-0.227406980062209</c:v>
+                  <c:v>0.0539253723624353</c:v>
+                </c:pt>
+                <c:pt idx="26">
+                  <c:v>0.0</c:v>
                 </c:pt>
               </c:numCache>
             </c:numRef>
@@ -1707,11 +1679,11 @@
           <c:order val="3"/>
           <c:tx>
             <c:strRef>
-              <c:f>threshold_b!$E$1</c:f>
+              <c:f>optimized_threshold_b!$E$1</c:f>
               <c:strCache>
                 <c:ptCount val="1"/>
                 <c:pt idx="0">
-                  <c:v>dGLN3</c:v>
+                  <c:v>GLN3</c:v>
                 </c:pt>
               </c:strCache>
             </c:strRef>
@@ -1719,7 +1691,7 @@
           <c:invertIfNegative val="0"/>
           <c:cat>
             <c:strRef>
-              <c:f>threshold_b!$A$2:$A$28</c:f>
+              <c:f>optimized_threshold_b!$A$2:$A$28</c:f>
               <c:strCache>
                 <c:ptCount val="27"/>
                 <c:pt idx="0">
@@ -1808,51 +1780,51 @@
           </c:cat>
           <c:val>
             <c:numRef>
-              <c:f>threshold_b!$E$2:$E$28</c:f>
+              <c:f>optimized_threshold_b!$E$2:$E$28</c:f>
               <c:numCache>
-                <c:formatCode>0.0000</c:formatCode>
+                <c:formatCode>General</c:formatCode>
                 <c:ptCount val="27"/>
                 <c:pt idx="5">
-                  <c:v>0.209399</c:v>
+                  <c:v>0.209399465600768</c:v>
                 </c:pt>
                 <c:pt idx="7">
-                  <c:v>0.950363</c:v>
+                  <c:v>0.95036344888317</c:v>
                 </c:pt>
                 <c:pt idx="9">
                   <c:v>0.0</c:v>
                 </c:pt>
                 <c:pt idx="10">
-                  <c:v>1.482408</c:v>
+                  <c:v>1.482407766302815</c:v>
                 </c:pt>
                 <c:pt idx="11">
-                  <c:v>0.614246</c:v>
+                  <c:v>0.614245954857868</c:v>
                 </c:pt>
                 <c:pt idx="12">
-                  <c:v>0.870922</c:v>
+                  <c:v>0.870922376778651</c:v>
                 </c:pt>
                 <c:pt idx="16">
-                  <c:v>1.661419</c:v>
+                  <c:v>1.661419406149075</c:v>
                 </c:pt>
                 <c:pt idx="17">
-                  <c:v>-0.01348</c:v>
+                  <c:v>-0.0134797756084702</c:v>
                 </c:pt>
                 <c:pt idx="19">
-                  <c:v>-0.02142</c:v>
+                  <c:v>-0.0214150723396686</c:v>
                 </c:pt>
                 <c:pt idx="21">
-                  <c:v>0.766078</c:v>
+                  <c:v>0.766078190282295</c:v>
                 </c:pt>
                 <c:pt idx="22">
-                  <c:v>-2.55388</c:v>
+                  <c:v>-2.553877634406508</c:v>
                 </c:pt>
                 <c:pt idx="23">
-                  <c:v>0.351001</c:v>
+                  <c:v>0.351001392906089</c:v>
                 </c:pt>
                 <c:pt idx="24">
-                  <c:v>1.108342</c:v>
+                  <c:v>1.108341513235848</c:v>
                 </c:pt>
                 <c:pt idx="25">
-                  <c:v>1.692328</c:v>
+                  <c:v>1.692328333743848</c:v>
                 </c:pt>
               </c:numCache>
             </c:numRef>
@@ -1863,11 +1835,11 @@
           <c:order val="4"/>
           <c:tx>
             <c:strRef>
-              <c:f>threshold_b!$F$1</c:f>
+              <c:f>optimized_threshold_b!$F$1</c:f>
               <c:strCache>
                 <c:ptCount val="1"/>
                 <c:pt idx="0">
-                  <c:v>dHAP4</c:v>
+                  <c:v>HAP4</c:v>
                 </c:pt>
               </c:strCache>
             </c:strRef>
@@ -1875,7 +1847,7 @@
           <c:invertIfNegative val="0"/>
           <c:cat>
             <c:strRef>
-              <c:f>threshold_b!$A$2:$A$28</c:f>
+              <c:f>optimized_threshold_b!$A$2:$A$28</c:f>
               <c:strCache>
                 <c:ptCount val="27"/>
                 <c:pt idx="0">
@@ -1964,9 +1936,9 @@
           </c:cat>
           <c:val>
             <c:numRef>
-              <c:f>threshold_b!$F$2:$F$28</c:f>
+              <c:f>optimized_threshold_b!$F$2:$F$28</c:f>
               <c:numCache>
-                <c:formatCode>0.0000</c:formatCode>
+                <c:formatCode>General</c:formatCode>
                 <c:ptCount val="27"/>
                 <c:pt idx="1">
                   <c:v>0.60024790543575</c:v>
@@ -2022,11 +1994,11 @@
           <c:order val="5"/>
           <c:tx>
             <c:strRef>
-              <c:f>threshold_b!$G$1</c:f>
+              <c:f>optimized_threshold_b!$G$1</c:f>
               <c:strCache>
                 <c:ptCount val="1"/>
                 <c:pt idx="0">
-                  <c:v>dZAP1</c:v>
+                  <c:v>ZAP1</c:v>
                 </c:pt>
               </c:strCache>
             </c:strRef>
@@ -2034,7 +2006,7 @@
           <c:invertIfNegative val="0"/>
           <c:cat>
             <c:strRef>
-              <c:f>threshold_b!$A$2:$A$28</c:f>
+              <c:f>optimized_threshold_b!$A$2:$A$28</c:f>
               <c:strCache>
                 <c:ptCount val="27"/>
                 <c:pt idx="0">
@@ -2123,9 +2095,9 @@
           </c:cat>
           <c:val>
             <c:numRef>
-              <c:f>threshold_b!$G$2:$G$28</c:f>
+              <c:f>optimized_threshold_b!$G$2:$G$28</c:f>
               <c:numCache>
-                <c:formatCode>0.0000</c:formatCode>
+                <c:formatCode>General</c:formatCode>
                 <c:ptCount val="27"/>
                 <c:pt idx="0">
                   <c:v>0.0</c:v>
@@ -2170,7 +2142,7 @@
                   <c:v>1.717458690616056</c:v>
                 </c:pt>
                 <c:pt idx="21">
-                  <c:v>-2.744608001</c:v>
+                  <c:v>-2.744608001249048</c:v>
                 </c:pt>
                 <c:pt idx="26">
                   <c:v>0.0</c:v>
@@ -2188,11 +2160,11 @@
           <c:showBubbleSize val="0"/>
         </c:dLbls>
         <c:gapWidth val="150"/>
-        <c:axId val="2133666264"/>
-        <c:axId val="2133462888"/>
+        <c:axId val="2119589320"/>
+        <c:axId val="2128453208"/>
       </c:barChart>
       <c:catAx>
-        <c:axId val="2133666264"/>
+        <c:axId val="2119589320"/>
         <c:scaling>
           <c:orientation val="minMax"/>
         </c:scaling>
@@ -2201,7 +2173,7 @@
         <c:majorTickMark val="out"/>
         <c:minorTickMark val="none"/>
         <c:tickLblPos val="nextTo"/>
-        <c:crossAx val="2133462888"/>
+        <c:crossAx val="2128453208"/>
         <c:crosses val="autoZero"/>
         <c:auto val="1"/>
         <c:lblAlgn val="ctr"/>
@@ -2209,34 +2181,25 @@
         <c:noMultiLvlLbl val="0"/>
       </c:catAx>
       <c:valAx>
-        <c:axId val="2133462888"/>
+        <c:axId val="2128453208"/>
         <c:scaling>
           <c:orientation val="minMax"/>
         </c:scaling>
         <c:delete val="0"/>
         <c:axPos val="l"/>
         <c:majorGridlines/>
-        <c:numFmt formatCode="General" sourceLinked="0"/>
+        <c:numFmt formatCode="General" sourceLinked="1"/>
         <c:majorTickMark val="out"/>
         <c:minorTickMark val="none"/>
         <c:tickLblPos val="nextTo"/>
-        <c:crossAx val="2133666264"/>
+        <c:crossAx val="2119589320"/>
         <c:crosses val="autoZero"/>
         <c:crossBetween val="between"/>
       </c:valAx>
     </c:plotArea>
     <c:legend>
       <c:legendPos val="r"/>
-      <c:layout>
-        <c:manualLayout>
-          <c:xMode val="edge"/>
-          <c:yMode val="edge"/>
-          <c:x val="0.876133748906387"/>
-          <c:y val="0.447637972618288"/>
-          <c:w val="0.108588473315836"/>
-          <c:h val="0.271390721430092"/>
-        </c:manualLayout>
-      </c:layout>
+      <c:layout/>
       <c:overlay val="0"/>
     </c:legend>
     <c:plotVisOnly val="1"/>
@@ -2248,8 +2211,9 @@
     <a:lstStyle/>
     <a:p>
       <a:pPr>
-        <a:defRPr sz="1100" b="1" i="0">
+        <a:defRPr sz="1100" b="1">
           <a:latin typeface="Arial"/>
+          <a:cs typeface="Arial"/>
         </a:defRPr>
       </a:pPr>
       <a:endParaRPr lang="en-US"/>
@@ -3065,11 +3029,11 @@
           <c:showBubbleSize val="0"/>
         </c:dLbls>
         <c:gapWidth val="150"/>
-        <c:axId val="2048626568"/>
-        <c:axId val="2048629704"/>
+        <c:axId val="2131265624"/>
+        <c:axId val="-2049411640"/>
       </c:barChart>
       <c:catAx>
-        <c:axId val="2048626568"/>
+        <c:axId val="2131265624"/>
         <c:scaling>
           <c:orientation val="minMax"/>
         </c:scaling>
@@ -3078,7 +3042,7 @@
         <c:majorTickMark val="out"/>
         <c:minorTickMark val="none"/>
         <c:tickLblPos val="nextTo"/>
-        <c:crossAx val="2048629704"/>
+        <c:crossAx val="-2049411640"/>
         <c:crosses val="autoZero"/>
         <c:auto val="1"/>
         <c:lblAlgn val="ctr"/>
@@ -3086,7 +3050,7 @@
         <c:noMultiLvlLbl val="0"/>
       </c:catAx>
       <c:valAx>
-        <c:axId val="2048629704"/>
+        <c:axId val="-2049411640"/>
         <c:scaling>
           <c:orientation val="minMax"/>
         </c:scaling>
@@ -3097,7 +3061,7 @@
         <c:majorTickMark val="out"/>
         <c:minorTickMark val="none"/>
         <c:tickLblPos val="nextTo"/>
-        <c:crossAx val="2048626568"/>
+        <c:crossAx val="2131265624"/>
         <c:crosses val="autoZero"/>
         <c:crossBetween val="between"/>
       </c:valAx>
@@ -3156,7 +3120,7 @@
           <c:order val="0"/>
           <c:tx>
             <c:strRef>
-              <c:f>optimization_diagnostics!$B$7</c:f>
+              <c:f>mse_comparison_dcin5!$B$2</c:f>
               <c:strCache>
                 <c:ptCount val="1"/>
                 <c:pt idx="0">
@@ -3168,119 +3132,101 @@
           <c:invertIfNegative val="0"/>
           <c:cat>
             <c:strRef>
-              <c:f>optimization_diagnostics!$A$8:$A$24</c:f>
+              <c:f>mse_comparison_dcin5!$A$3:$A$16</c:f>
               <c:strCache>
-                <c:ptCount val="17"/>
-                <c:pt idx="0">
-                  <c:v>ACE2</c:v>
+                <c:ptCount val="14"/>
+                <c:pt idx="0">
+                  <c:v>CIN5</c:v>
                 </c:pt>
                 <c:pt idx="1">
-                  <c:v>CIN5</c:v>
+                  <c:v>GCR2</c:v>
                 </c:pt>
                 <c:pt idx="2">
-                  <c:v>GCR2</c:v>
+                  <c:v>GLN3</c:v>
                 </c:pt>
                 <c:pt idx="3">
-                  <c:v>GLN3</c:v>
+                  <c:v>HAP4</c:v>
                 </c:pt>
                 <c:pt idx="4">
-                  <c:v>HAP4</c:v>
+                  <c:v>HMO1</c:v>
                 </c:pt>
                 <c:pt idx="5">
-                  <c:v>HMO1</c:v>
+                  <c:v>MGA2</c:v>
                 </c:pt>
                 <c:pt idx="6">
-                  <c:v>MCM1</c:v>
+                  <c:v>MSN2</c:v>
                 </c:pt>
                 <c:pt idx="7">
-                  <c:v>MGA2</c:v>
+                  <c:v>RDS3</c:v>
                 </c:pt>
                 <c:pt idx="8">
-                  <c:v>MSN2</c:v>
+                  <c:v>SFP1</c:v>
                 </c:pt>
                 <c:pt idx="9">
-                  <c:v>RDS3</c:v>
+                  <c:v>STB5</c:v>
                 </c:pt>
                 <c:pt idx="10">
-                  <c:v>SFP1</c:v>
+                  <c:v>SWI4</c:v>
                 </c:pt>
                 <c:pt idx="11">
-                  <c:v>STB5</c:v>
+                  <c:v>SWI5</c:v>
                 </c:pt>
                 <c:pt idx="12">
-                  <c:v>SWI4</c:v>
+                  <c:v>YHP1</c:v>
                 </c:pt>
                 <c:pt idx="13">
-                  <c:v>SWI5</c:v>
-                </c:pt>
-                <c:pt idx="14">
-                  <c:v>YHP1</c:v>
-                </c:pt>
-                <c:pt idx="15">
                   <c:v>YOX1</c:v>
-                </c:pt>
-                <c:pt idx="16">
-                  <c:v>ZAP1</c:v>
                 </c:pt>
               </c:strCache>
             </c:strRef>
           </c:cat>
           <c:val>
             <c:numRef>
-              <c:f>optimization_diagnostics!$B$8:$B$24</c:f>
+              <c:f>mse_comparison_dcin5!$B$3:$B$16</c:f>
               <c:numCache>
                 <c:formatCode>General</c:formatCode>
-                <c:ptCount val="17"/>
-                <c:pt idx="0">
-                  <c:v>0.411320538043566</c:v>
+                <c:ptCount val="14"/>
+                <c:pt idx="0">
+                  <c:v>0.722796301432969</c:v>
                 </c:pt>
                 <c:pt idx="1">
-                  <c:v>0.845771701780911</c:v>
+                  <c:v>0.471652365539266</c:v>
                 </c:pt>
                 <c:pt idx="2">
-                  <c:v>0.501992303918619</c:v>
+                  <c:v>0.501083326232173</c:v>
                 </c:pt>
                 <c:pt idx="3">
-                  <c:v>0.477325188324043</c:v>
+                  <c:v>2.127443807784427</c:v>
                 </c:pt>
                 <c:pt idx="4">
-                  <c:v>2.101884284529554</c:v>
+                  <c:v>0.64500107184359</c:v>
                 </c:pt>
                 <c:pt idx="5">
-                  <c:v>0.64028441694525</c:v>
+                  <c:v>0.481662378835605</c:v>
                 </c:pt>
                 <c:pt idx="6">
-                  <c:v>1.232337375273702</c:v>
+                  <c:v>0.528876493871981</c:v>
                 </c:pt>
                 <c:pt idx="7">
-                  <c:v>0.532454011461283</c:v>
+                  <c:v>0.23004290427067</c:v>
                 </c:pt>
                 <c:pt idx="8">
-                  <c:v>0.541588997349779</c:v>
+                  <c:v>0.988962937396496</c:v>
                 </c:pt>
                 <c:pt idx="9">
-                  <c:v>0.23177770455563</c:v>
+                  <c:v>1.869963965357812</c:v>
                 </c:pt>
                 <c:pt idx="10">
-                  <c:v>0.994041334161549</c:v>
+                  <c:v>0.262067785115692</c:v>
                 </c:pt>
                 <c:pt idx="11">
-                  <c:v>1.85394626426909</c:v>
+                  <c:v>0.460644501686291</c:v>
                 </c:pt>
                 <c:pt idx="12">
-                  <c:v>0.282293594424155</c:v>
+                  <c:v>0.88318268939703</c:v>
                 </c:pt>
                 <c:pt idx="13">
-                  <c:v>0.451991321518238</c:v>
-                </c:pt>
-                <c:pt idx="14">
-                  <c:v>0.723444414982261</c:v>
-                </c:pt>
-                <c:pt idx="15">
-                  <c:v>0.406136827120828</c:v>
-                </c:pt>
-                <c:pt idx="16">
-                  <c:v>2.059781692109081</c:v>
+                  <c:v>0.430641413252234</c:v>
                 </c:pt>
               </c:numCache>
             </c:numRef>
@@ -3291,7 +3237,7 @@
           <c:order val="1"/>
           <c:tx>
             <c:strRef>
-              <c:f>optimization_diagnostics!$C$7</c:f>
+              <c:f>mse_comparison_dcin5!$C$2</c:f>
               <c:strCache>
                 <c:ptCount val="1"/>
                 <c:pt idx="0">
@@ -3303,119 +3249,101 @@
           <c:invertIfNegative val="0"/>
           <c:cat>
             <c:strRef>
-              <c:f>optimization_diagnostics!$A$8:$A$24</c:f>
+              <c:f>mse_comparison_dcin5!$A$3:$A$16</c:f>
               <c:strCache>
-                <c:ptCount val="17"/>
-                <c:pt idx="0">
-                  <c:v>ACE2</c:v>
+                <c:ptCount val="14"/>
+                <c:pt idx="0">
+                  <c:v>CIN5</c:v>
                 </c:pt>
                 <c:pt idx="1">
-                  <c:v>CIN5</c:v>
+                  <c:v>GCR2</c:v>
                 </c:pt>
                 <c:pt idx="2">
-                  <c:v>GCR2</c:v>
+                  <c:v>GLN3</c:v>
                 </c:pt>
                 <c:pt idx="3">
-                  <c:v>GLN3</c:v>
+                  <c:v>HAP4</c:v>
                 </c:pt>
                 <c:pt idx="4">
-                  <c:v>HAP4</c:v>
+                  <c:v>HMO1</c:v>
                 </c:pt>
                 <c:pt idx="5">
-                  <c:v>HMO1</c:v>
+                  <c:v>MGA2</c:v>
                 </c:pt>
                 <c:pt idx="6">
-                  <c:v>MCM1</c:v>
+                  <c:v>MSN2</c:v>
                 </c:pt>
                 <c:pt idx="7">
-                  <c:v>MGA2</c:v>
+                  <c:v>RDS3</c:v>
                 </c:pt>
                 <c:pt idx="8">
-                  <c:v>MSN2</c:v>
+                  <c:v>SFP1</c:v>
                 </c:pt>
                 <c:pt idx="9">
-                  <c:v>RDS3</c:v>
+                  <c:v>STB5</c:v>
                 </c:pt>
                 <c:pt idx="10">
-                  <c:v>SFP1</c:v>
+                  <c:v>SWI4</c:v>
                 </c:pt>
                 <c:pt idx="11">
-                  <c:v>STB5</c:v>
+                  <c:v>SWI5</c:v>
                 </c:pt>
                 <c:pt idx="12">
-                  <c:v>SWI4</c:v>
+                  <c:v>YHP1</c:v>
                 </c:pt>
                 <c:pt idx="13">
-                  <c:v>SWI5</c:v>
-                </c:pt>
-                <c:pt idx="14">
-                  <c:v>YHP1</c:v>
-                </c:pt>
-                <c:pt idx="15">
                   <c:v>YOX1</c:v>
-                </c:pt>
-                <c:pt idx="16">
-                  <c:v>ZAP1</c:v>
                 </c:pt>
               </c:strCache>
             </c:strRef>
           </c:cat>
           <c:val>
             <c:numRef>
-              <c:f>optimization_diagnostics!$C$8:$C$24</c:f>
+              <c:f>mse_comparison_dcin5!$C$3:$C$16</c:f>
               <c:numCache>
                 <c:formatCode>General</c:formatCode>
-                <c:ptCount val="17"/>
-                <c:pt idx="0">
-                  <c:v>0.0992847214059903</c:v>
+                <c:ptCount val="14"/>
+                <c:pt idx="0">
+                  <c:v>0.1449642125</c:v>
                 </c:pt>
                 <c:pt idx="1">
-                  <c:v>0.1389393325</c:v>
+                  <c:v>0.8437907732622</c:v>
                 </c:pt>
                 <c:pt idx="2">
-                  <c:v>0.889269757742526</c:v>
+                  <c:v>0.27793107733272</c:v>
                 </c:pt>
                 <c:pt idx="3">
-                  <c:v>0.198700951721269</c:v>
+                  <c:v>1.171059174722969</c:v>
                 </c:pt>
                 <c:pt idx="4">
-                  <c:v>1.183647826891488</c:v>
+                  <c:v>0.651958990905892</c:v>
                 </c:pt>
                 <c:pt idx="5">
-                  <c:v>0.625782206554727</c:v>
+                  <c:v>0.143179050891051</c:v>
                 </c:pt>
                 <c:pt idx="6">
-                  <c:v>0.817620085406046</c:v>
+                  <c:v>0.33402687680756</c:v>
                 </c:pt>
                 <c:pt idx="7">
-                  <c:v>0.129828579881061</c:v>
+                  <c:v>0.482021233727974</c:v>
                 </c:pt>
                 <c:pt idx="8">
-                  <c:v>0.338170556478448</c:v>
+                  <c:v>0.263505708328233</c:v>
                 </c:pt>
                 <c:pt idx="9">
-                  <c:v>0.481540318051162</c:v>
+                  <c:v>0.882053881820877</c:v>
                 </c:pt>
                 <c:pt idx="10">
-                  <c:v>0.260127401014454</c:v>
+                  <c:v>0.791715274610002</c:v>
                 </c:pt>
                 <c:pt idx="11">
-                  <c:v>0.873414290980528</c:v>
+                  <c:v>0.267404891842492</c:v>
                 </c:pt>
                 <c:pt idx="12">
-                  <c:v>0.661970311135113</c:v>
+                  <c:v>0.662672466144309</c:v>
                 </c:pt>
                 <c:pt idx="13">
-                  <c:v>0.227080644692146</c:v>
-                </c:pt>
-                <c:pt idx="14">
-                  <c:v>0.662041868468755</c:v>
-                </c:pt>
-                <c:pt idx="15">
-                  <c:v>0.741316339848555</c:v>
-                </c:pt>
-                <c:pt idx="16">
-                  <c:v>0.663282284912506</c:v>
+                  <c:v>0.757811874505138</c:v>
                 </c:pt>
               </c:numCache>
             </c:numRef>
@@ -3426,7 +3354,7 @@
           <c:order val="2"/>
           <c:tx>
             <c:strRef>
-              <c:f>optimization_diagnostics!$D$7</c:f>
+              <c:f>mse_comparison_dcin5!$D$2</c:f>
               <c:strCache>
                 <c:ptCount val="1"/>
                 <c:pt idx="0">
@@ -3438,119 +3366,101 @@
           <c:invertIfNegative val="0"/>
           <c:cat>
             <c:strRef>
-              <c:f>optimization_diagnostics!$A$8:$A$24</c:f>
+              <c:f>mse_comparison_dcin5!$A$3:$A$16</c:f>
               <c:strCache>
-                <c:ptCount val="17"/>
-                <c:pt idx="0">
-                  <c:v>ACE2</c:v>
+                <c:ptCount val="14"/>
+                <c:pt idx="0">
+                  <c:v>CIN5</c:v>
                 </c:pt>
                 <c:pt idx="1">
-                  <c:v>CIN5</c:v>
+                  <c:v>GCR2</c:v>
                 </c:pt>
                 <c:pt idx="2">
-                  <c:v>GCR2</c:v>
+                  <c:v>GLN3</c:v>
                 </c:pt>
                 <c:pt idx="3">
-                  <c:v>GLN3</c:v>
+                  <c:v>HAP4</c:v>
                 </c:pt>
                 <c:pt idx="4">
-                  <c:v>HAP4</c:v>
+                  <c:v>HMO1</c:v>
                 </c:pt>
                 <c:pt idx="5">
-                  <c:v>HMO1</c:v>
+                  <c:v>MGA2</c:v>
                 </c:pt>
                 <c:pt idx="6">
-                  <c:v>MCM1</c:v>
+                  <c:v>MSN2</c:v>
                 </c:pt>
                 <c:pt idx="7">
-                  <c:v>MGA2</c:v>
+                  <c:v>RDS3</c:v>
                 </c:pt>
                 <c:pt idx="8">
-                  <c:v>MSN2</c:v>
+                  <c:v>SFP1</c:v>
                 </c:pt>
                 <c:pt idx="9">
-                  <c:v>RDS3</c:v>
+                  <c:v>STB5</c:v>
                 </c:pt>
                 <c:pt idx="10">
-                  <c:v>SFP1</c:v>
+                  <c:v>SWI4</c:v>
                 </c:pt>
                 <c:pt idx="11">
-                  <c:v>STB5</c:v>
+                  <c:v>SWI5</c:v>
                 </c:pt>
                 <c:pt idx="12">
-                  <c:v>SWI4</c:v>
+                  <c:v>YHP1</c:v>
                 </c:pt>
                 <c:pt idx="13">
-                  <c:v>SWI5</c:v>
-                </c:pt>
-                <c:pt idx="14">
-                  <c:v>YHP1</c:v>
-                </c:pt>
-                <c:pt idx="15">
                   <c:v>YOX1</c:v>
-                </c:pt>
-                <c:pt idx="16">
-                  <c:v>ZAP1</c:v>
                 </c:pt>
               </c:strCache>
             </c:strRef>
           </c:cat>
           <c:val>
             <c:numRef>
-              <c:f>optimization_diagnostics!$D$8:$D$24</c:f>
+              <c:f>mse_comparison_dcin5!$D$3:$D$16</c:f>
               <c:numCache>
                 <c:formatCode>General</c:formatCode>
-                <c:ptCount val="17"/>
-                <c:pt idx="0">
-                  <c:v>1.261948602936334</c:v>
+                <c:ptCount val="14"/>
+                <c:pt idx="0">
+                  <c:v>0.868803248792668</c:v>
                 </c:pt>
                 <c:pt idx="1">
-                  <c:v>0.878713872802487</c:v>
+                  <c:v>0.786890430110147</c:v>
                 </c:pt>
                 <c:pt idx="2">
-                  <c:v>0.772752471836118</c:v>
+                  <c:v>0.353261053333333</c:v>
                 </c:pt>
                 <c:pt idx="3">
-                  <c:v>0.353261053333333</c:v>
+                  <c:v>1.522384663672216</c:v>
                 </c:pt>
                 <c:pt idx="4">
-                  <c:v>1.425636687550394</c:v>
+                  <c:v>0.305352427230384</c:v>
                 </c:pt>
                 <c:pt idx="5">
-                  <c:v>0.308122272768119</c:v>
+                  <c:v>0.130605750133767</c:v>
                 </c:pt>
                 <c:pt idx="6">
-                  <c:v>4.128760338869433</c:v>
+                  <c:v>0.845376213993732</c:v>
                 </c:pt>
                 <c:pt idx="7">
-                  <c:v>0.132214349190385</c:v>
+                  <c:v>1.106254952877855</c:v>
                 </c:pt>
                 <c:pt idx="8">
-                  <c:v>0.86498101849668</c:v>
+                  <c:v>0.9653958908835</c:v>
                 </c:pt>
                 <c:pt idx="9">
-                  <c:v>1.072482715368971</c:v>
+                  <c:v>0.349403875122439</c:v>
                 </c:pt>
                 <c:pt idx="10">
-                  <c:v>0.916542210133224</c:v>
+                  <c:v>0.413856534852239</c:v>
                 </c:pt>
                 <c:pt idx="11">
-                  <c:v>0.353959764302183</c:v>
+                  <c:v>0.275315809185295</c:v>
                 </c:pt>
                 <c:pt idx="12">
-                  <c:v>0.444957970170115</c:v>
+                  <c:v>0.804769896080673</c:v>
                 </c:pt>
                 <c:pt idx="13">
-                  <c:v>0.274295430367903</c:v>
-                </c:pt>
-                <c:pt idx="14">
-                  <c:v>0.950572388803823</c:v>
-                </c:pt>
-                <c:pt idx="15">
-                  <c:v>1.491243925144466</c:v>
-                </c:pt>
-                <c:pt idx="16">
-                  <c:v>1.300966547520272</c:v>
+                  <c:v>1.353228209769899</c:v>
                 </c:pt>
               </c:numCache>
             </c:numRef>
@@ -3561,7 +3471,7 @@
           <c:order val="3"/>
           <c:tx>
             <c:strRef>
-              <c:f>optimization_diagnostics!$E$7</c:f>
+              <c:f>mse_comparison_dcin5!$E$2</c:f>
               <c:strCache>
                 <c:ptCount val="1"/>
                 <c:pt idx="0">
@@ -3573,119 +3483,101 @@
           <c:invertIfNegative val="0"/>
           <c:cat>
             <c:strRef>
-              <c:f>optimization_diagnostics!$A$8:$A$24</c:f>
+              <c:f>mse_comparison_dcin5!$A$3:$A$16</c:f>
               <c:strCache>
-                <c:ptCount val="17"/>
-                <c:pt idx="0">
-                  <c:v>ACE2</c:v>
+                <c:ptCount val="14"/>
+                <c:pt idx="0">
+                  <c:v>CIN5</c:v>
                 </c:pt>
                 <c:pt idx="1">
-                  <c:v>CIN5</c:v>
+                  <c:v>GCR2</c:v>
                 </c:pt>
                 <c:pt idx="2">
-                  <c:v>GCR2</c:v>
+                  <c:v>GLN3</c:v>
                 </c:pt>
                 <c:pt idx="3">
-                  <c:v>GLN3</c:v>
+                  <c:v>HAP4</c:v>
                 </c:pt>
                 <c:pt idx="4">
-                  <c:v>HAP4</c:v>
+                  <c:v>HMO1</c:v>
                 </c:pt>
                 <c:pt idx="5">
-                  <c:v>HMO1</c:v>
+                  <c:v>MGA2</c:v>
                 </c:pt>
                 <c:pt idx="6">
-                  <c:v>MCM1</c:v>
+                  <c:v>MSN2</c:v>
                 </c:pt>
                 <c:pt idx="7">
-                  <c:v>MGA2</c:v>
+                  <c:v>RDS3</c:v>
                 </c:pt>
                 <c:pt idx="8">
-                  <c:v>MSN2</c:v>
+                  <c:v>SFP1</c:v>
                 </c:pt>
                 <c:pt idx="9">
-                  <c:v>RDS3</c:v>
+                  <c:v>STB5</c:v>
                 </c:pt>
                 <c:pt idx="10">
-                  <c:v>SFP1</c:v>
+                  <c:v>SWI4</c:v>
                 </c:pt>
                 <c:pt idx="11">
-                  <c:v>STB5</c:v>
+                  <c:v>SWI5</c:v>
                 </c:pt>
                 <c:pt idx="12">
-                  <c:v>SWI4</c:v>
+                  <c:v>YHP1</c:v>
                 </c:pt>
                 <c:pt idx="13">
-                  <c:v>SWI5</c:v>
-                </c:pt>
-                <c:pt idx="14">
-                  <c:v>YHP1</c:v>
-                </c:pt>
-                <c:pt idx="15">
                   <c:v>YOX1</c:v>
-                </c:pt>
-                <c:pt idx="16">
-                  <c:v>ZAP1</c:v>
                 </c:pt>
               </c:strCache>
             </c:strRef>
           </c:cat>
           <c:val>
             <c:numRef>
-              <c:f>optimization_diagnostics!$E$8:$E$24</c:f>
+              <c:f>mse_comparison_dcin5!$E$3:$E$16</c:f>
               <c:numCache>
                 <c:formatCode>General</c:formatCode>
-                <c:ptCount val="17"/>
-                <c:pt idx="0">
-                  <c:v>0.197798678310261</c:v>
+                <c:ptCount val="14"/>
+                <c:pt idx="0">
+                  <c:v>1.06705691787989</c:v>
                 </c:pt>
                 <c:pt idx="1">
-                  <c:v>0.919000176237511</c:v>
+                  <c:v>0.955850614091442</c:v>
                 </c:pt>
                 <c:pt idx="2">
-                  <c:v>0.858387193803839</c:v>
+                  <c:v>0.190995615343442</c:v>
                 </c:pt>
                 <c:pt idx="3">
-                  <c:v>0.192362687626674</c:v>
+                  <c:v>0.4916199175</c:v>
                 </c:pt>
                 <c:pt idx="4">
-                  <c:v>0.533208381666667</c:v>
+                  <c:v>2.78441041456627</c:v>
                 </c:pt>
                 <c:pt idx="5">
-                  <c:v>2.795444445899142</c:v>
+                  <c:v>0.205377433872493</c:v>
                 </c:pt>
                 <c:pt idx="6">
-                  <c:v>1.241842092099991</c:v>
+                  <c:v>0.24388366415242</c:v>
                 </c:pt>
                 <c:pt idx="7">
-                  <c:v>0.186301445428574</c:v>
+                  <c:v>0.266736258453233</c:v>
                 </c:pt>
                 <c:pt idx="8">
-                  <c:v>0.247234965269412</c:v>
+                  <c:v>0.183628527401954</c:v>
                 </c:pt>
                 <c:pt idx="9">
-                  <c:v>0.215877930707689</c:v>
+                  <c:v>0.178039546563152</c:v>
                 </c:pt>
                 <c:pt idx="10">
-                  <c:v>0.219148085771887</c:v>
+                  <c:v>0.263824911696646</c:v>
                 </c:pt>
                 <c:pt idx="11">
-                  <c:v>0.15193010519539</c:v>
+                  <c:v>0.486440855330612</c:v>
                 </c:pt>
                 <c:pt idx="12">
-                  <c:v>0.157652062429708</c:v>
+                  <c:v>0.45159162324665</c:v>
                 </c:pt>
                 <c:pt idx="13">
-                  <c:v>0.577074884810262</c:v>
-                </c:pt>
-                <c:pt idx="14">
-                  <c:v>0.295675175881401</c:v>
-                </c:pt>
-                <c:pt idx="15">
-                  <c:v>0.710567333003024</c:v>
-                </c:pt>
-                <c:pt idx="16">
-                  <c:v>0.786470832838076</c:v>
+                  <c:v>0.801192946652702</c:v>
                 </c:pt>
               </c:numCache>
             </c:numRef>
@@ -3696,7 +3588,7 @@
           <c:order val="4"/>
           <c:tx>
             <c:strRef>
-              <c:f>optimization_diagnostics!$F$7</c:f>
+              <c:f>mse_comparison_dcin5!$F$2</c:f>
               <c:strCache>
                 <c:ptCount val="1"/>
                 <c:pt idx="0">
@@ -3708,254 +3600,101 @@
           <c:invertIfNegative val="0"/>
           <c:cat>
             <c:strRef>
-              <c:f>optimization_diagnostics!$A$8:$A$24</c:f>
+              <c:f>mse_comparison_dcin5!$A$3:$A$16</c:f>
               <c:strCache>
-                <c:ptCount val="17"/>
-                <c:pt idx="0">
-                  <c:v>ACE2</c:v>
+                <c:ptCount val="14"/>
+                <c:pt idx="0">
+                  <c:v>CIN5</c:v>
                 </c:pt>
                 <c:pt idx="1">
-                  <c:v>CIN5</c:v>
+                  <c:v>GCR2</c:v>
                 </c:pt>
                 <c:pt idx="2">
-                  <c:v>GCR2</c:v>
+                  <c:v>GLN3</c:v>
                 </c:pt>
                 <c:pt idx="3">
-                  <c:v>GLN3</c:v>
+                  <c:v>HAP4</c:v>
                 </c:pt>
                 <c:pt idx="4">
-                  <c:v>HAP4</c:v>
+                  <c:v>HMO1</c:v>
                 </c:pt>
                 <c:pt idx="5">
-                  <c:v>HMO1</c:v>
+                  <c:v>MGA2</c:v>
                 </c:pt>
                 <c:pt idx="6">
-                  <c:v>MCM1</c:v>
+                  <c:v>MSN2</c:v>
                 </c:pt>
                 <c:pt idx="7">
-                  <c:v>MGA2</c:v>
+                  <c:v>RDS3</c:v>
                 </c:pt>
                 <c:pt idx="8">
-                  <c:v>MSN2</c:v>
+                  <c:v>SFP1</c:v>
                 </c:pt>
                 <c:pt idx="9">
-                  <c:v>RDS3</c:v>
+                  <c:v>STB5</c:v>
                 </c:pt>
                 <c:pt idx="10">
-                  <c:v>SFP1</c:v>
+                  <c:v>SWI4</c:v>
                 </c:pt>
                 <c:pt idx="11">
-                  <c:v>STB5</c:v>
+                  <c:v>SWI5</c:v>
                 </c:pt>
                 <c:pt idx="12">
-                  <c:v>SWI4</c:v>
+                  <c:v>YHP1</c:v>
                 </c:pt>
                 <c:pt idx="13">
-                  <c:v>SWI5</c:v>
-                </c:pt>
-                <c:pt idx="14">
-                  <c:v>YHP1</c:v>
-                </c:pt>
-                <c:pt idx="15">
                   <c:v>YOX1</c:v>
-                </c:pt>
-                <c:pt idx="16">
-                  <c:v>ZAP1</c:v>
                 </c:pt>
               </c:strCache>
             </c:strRef>
           </c:cat>
           <c:val>
             <c:numRef>
-              <c:f>optimization_diagnostics!$F$8:$F$24</c:f>
+              <c:f>mse_comparison_dcin5!$F$3:$F$16</c:f>
               <c:numCache>
                 <c:formatCode>General</c:formatCode>
-                <c:ptCount val="17"/>
-                <c:pt idx="0">
-                  <c:v>0.199846144472241</c:v>
+                <c:ptCount val="14"/>
+                <c:pt idx="0">
+                  <c:v>0.797075709458288</c:v>
                 </c:pt>
                 <c:pt idx="1">
-                  <c:v>0.759404221513909</c:v>
+                  <c:v>0.479130238299297</c:v>
                 </c:pt>
                 <c:pt idx="2">
-                  <c:v>0.497045171344652</c:v>
+                  <c:v>0.28476554166879</c:v>
                 </c:pt>
                 <c:pt idx="3">
-                  <c:v>0.249779442160381</c:v>
+                  <c:v>1.421461527614763</c:v>
                 </c:pt>
                 <c:pt idx="4">
-                  <c:v>1.485298494544057</c:v>
+                  <c:v>0.593595616666667</c:v>
                 </c:pt>
                 <c:pt idx="5">
-                  <c:v>0.593595616666667</c:v>
+                  <c:v>0.295700559726016</c:v>
                 </c:pt>
                 <c:pt idx="6">
-                  <c:v>3.12607711412136</c:v>
+                  <c:v>0.444605025134897</c:v>
                 </c:pt>
                 <c:pt idx="7">
-                  <c:v>0.298201977764395</c:v>
+                  <c:v>1.835185132381002</c:v>
                 </c:pt>
                 <c:pt idx="8">
-                  <c:v>0.477302943379906</c:v>
+                  <c:v>1.161156936772133</c:v>
                 </c:pt>
                 <c:pt idx="9">
-                  <c:v>1.790149960974662</c:v>
+                  <c:v>0.53753662840439</c:v>
                 </c:pt>
                 <c:pt idx="10">
-                  <c:v>1.080877286301819</c:v>
+                  <c:v>0.255804481827353</c:v>
                 </c:pt>
                 <c:pt idx="11">
-                  <c:v>0.529463493612634</c:v>
+                  <c:v>0.27140737279938</c:v>
                 </c:pt>
                 <c:pt idx="12">
-                  <c:v>0.248228445582492</c:v>
+                  <c:v>0.360283645617838</c:v>
                 </c:pt>
                 <c:pt idx="13">
-                  <c:v>0.23381860952912</c:v>
-                </c:pt>
-                <c:pt idx="14">
-                  <c:v>0.301836724650599</c:v>
-                </c:pt>
-                <c:pt idx="15">
-                  <c:v>0.664446494403275</c:v>
-                </c:pt>
-                <c:pt idx="16">
-                  <c:v>0.478156570855901</c:v>
-                </c:pt>
-              </c:numCache>
-            </c:numRef>
-          </c:val>
-        </c:ser>
-        <c:ser>
-          <c:idx val="5"/>
-          <c:order val="5"/>
-          <c:tx>
-            <c:strRef>
-              <c:f>optimization_diagnostics!$G$7</c:f>
-              <c:strCache>
-                <c:ptCount val="1"/>
-                <c:pt idx="0">
-                  <c:v>ZAP1 MSE</c:v>
-                </c:pt>
-              </c:strCache>
-            </c:strRef>
-          </c:tx>
-          <c:invertIfNegative val="0"/>
-          <c:cat>
-            <c:strRef>
-              <c:f>optimization_diagnostics!$A$8:$A$24</c:f>
-              <c:strCache>
-                <c:ptCount val="17"/>
-                <c:pt idx="0">
-                  <c:v>ACE2</c:v>
-                </c:pt>
-                <c:pt idx="1">
-                  <c:v>CIN5</c:v>
-                </c:pt>
-                <c:pt idx="2">
-                  <c:v>GCR2</c:v>
-                </c:pt>
-                <c:pt idx="3">
-                  <c:v>GLN3</c:v>
-                </c:pt>
-                <c:pt idx="4">
-                  <c:v>HAP4</c:v>
-                </c:pt>
-                <c:pt idx="5">
-                  <c:v>HMO1</c:v>
-                </c:pt>
-                <c:pt idx="6">
-                  <c:v>MCM1</c:v>
-                </c:pt>
-                <c:pt idx="7">
-                  <c:v>MGA2</c:v>
-                </c:pt>
-                <c:pt idx="8">
-                  <c:v>MSN2</c:v>
-                </c:pt>
-                <c:pt idx="9">
-                  <c:v>RDS3</c:v>
-                </c:pt>
-                <c:pt idx="10">
-                  <c:v>SFP1</c:v>
-                </c:pt>
-                <c:pt idx="11">
-                  <c:v>STB5</c:v>
-                </c:pt>
-                <c:pt idx="12">
-                  <c:v>SWI4</c:v>
-                </c:pt>
-                <c:pt idx="13">
-                  <c:v>SWI5</c:v>
-                </c:pt>
-                <c:pt idx="14">
-                  <c:v>YHP1</c:v>
-                </c:pt>
-                <c:pt idx="15">
-                  <c:v>YOX1</c:v>
-                </c:pt>
-                <c:pt idx="16">
-                  <c:v>ZAP1</c:v>
-                </c:pt>
-              </c:strCache>
-            </c:strRef>
-          </c:cat>
-          <c:val>
-            <c:numRef>
-              <c:f>optimization_diagnostics!$G$8:$G$24</c:f>
-              <c:numCache>
-                <c:formatCode>General</c:formatCode>
-                <c:ptCount val="17"/>
-                <c:pt idx="0">
-                  <c:v>0.850252951034045</c:v>
-                </c:pt>
-                <c:pt idx="1">
-                  <c:v>0.654608305705414</c:v>
-                </c:pt>
-                <c:pt idx="2">
-                  <c:v>0.232852761733475</c:v>
-                </c:pt>
-                <c:pt idx="3">
-                  <c:v>0.162253066039771</c:v>
-                </c:pt>
-                <c:pt idx="4">
-                  <c:v>0.598531288176671</c:v>
-                </c:pt>
-                <c:pt idx="5">
-                  <c:v>0.584332624283594</c:v>
-                </c:pt>
-                <c:pt idx="6">
-                  <c:v>3.739998244700803</c:v>
-                </c:pt>
-                <c:pt idx="7">
-                  <c:v>0.383648279628723</c:v>
-                </c:pt>
-                <c:pt idx="8">
-                  <c:v>0.292957299957133</c:v>
-                </c:pt>
-                <c:pt idx="9">
-                  <c:v>0.914959528665258</c:v>
-                </c:pt>
-                <c:pt idx="10">
-                  <c:v>0.331897419989214</c:v>
-                </c:pt>
-                <c:pt idx="11">
-                  <c:v>1.333338712602204</c:v>
-                </c:pt>
-                <c:pt idx="12">
-                  <c:v>0.257173668845343</c:v>
-                </c:pt>
-                <c:pt idx="13">
-                  <c:v>0.286280148823619</c:v>
-                </c:pt>
-                <c:pt idx="14">
-                  <c:v>0.480908408788092</c:v>
-                </c:pt>
-                <c:pt idx="15">
-                  <c:v>0.4958165385531</c:v>
-                </c:pt>
-                <c:pt idx="16">
-                  <c:v>3.159033750833333</c:v>
+                  <c:v>0.661193185799969</c:v>
                 </c:pt>
               </c:numCache>
             </c:numRef>
@@ -3970,11 +3709,11 @@
           <c:showBubbleSize val="0"/>
         </c:dLbls>
         <c:gapWidth val="150"/>
-        <c:axId val="2133146824"/>
-        <c:axId val="2134785960"/>
+        <c:axId val="-2105318872"/>
+        <c:axId val="-2049907576"/>
       </c:barChart>
       <c:catAx>
-        <c:axId val="2133146824"/>
+        <c:axId val="-2105318872"/>
         <c:scaling>
           <c:orientation val="minMax"/>
         </c:scaling>
@@ -3983,7 +3722,7 @@
         <c:majorTickMark val="out"/>
         <c:minorTickMark val="none"/>
         <c:tickLblPos val="nextTo"/>
-        <c:crossAx val="2134785960"/>
+        <c:crossAx val="-2049907576"/>
         <c:crosses val="autoZero"/>
         <c:auto val="1"/>
         <c:lblAlgn val="ctr"/>
@@ -3991,7 +3730,7 @@
         <c:noMultiLvlLbl val="0"/>
       </c:catAx>
       <c:valAx>
-        <c:axId val="2134785960"/>
+        <c:axId val="-2049907576"/>
         <c:scaling>
           <c:orientation val="minMax"/>
         </c:scaling>
@@ -4002,7 +3741,7 @@
         <c:majorTickMark val="out"/>
         <c:minorTickMark val="none"/>
         <c:tickLblPos val="nextTo"/>
-        <c:crossAx val="2133146824"/>
+        <c:crossAx val="-2105318872"/>
         <c:crosses val="autoZero"/>
         <c:crossBetween val="between"/>
       </c:valAx>
@@ -4021,8 +3760,9 @@
     <a:lstStyle/>
     <a:p>
       <a:pPr>
-        <a:defRPr sz="1100" b="1" i="0">
+        <a:defRPr sz="1100" b="1">
           <a:latin typeface="Arial"/>
+          <a:cs typeface="Arial"/>
         </a:defRPr>
       </a:pPr>
       <a:endParaRPr lang="en-US"/>
@@ -4060,7 +3800,7 @@
           <c:order val="0"/>
           <c:tx>
             <c:strRef>
-              <c:f>optimization_diagnostics!$B$7</c:f>
+              <c:f>mse_comparison_dcin5!$I$2</c:f>
               <c:strCache>
                 <c:ptCount val="1"/>
                 <c:pt idx="0">
@@ -4072,101 +3812,119 @@
           <c:invertIfNegative val="0"/>
           <c:cat>
             <c:strRef>
-              <c:f>optimization_diagnostics!$A$8:$A$21</c:f>
+              <c:f>mse_comparison_dcin5!$H$3:$H$19</c:f>
               <c:strCache>
-                <c:ptCount val="14"/>
-                <c:pt idx="0">
+                <c:ptCount val="17"/>
+                <c:pt idx="0">
+                  <c:v>ACE2</c:v>
+                </c:pt>
+                <c:pt idx="1">
                   <c:v>CIN5</c:v>
                 </c:pt>
-                <c:pt idx="1">
+                <c:pt idx="2">
                   <c:v>GCR2</c:v>
                 </c:pt>
-                <c:pt idx="2">
+                <c:pt idx="3">
                   <c:v>GLN3</c:v>
                 </c:pt>
-                <c:pt idx="3">
+                <c:pt idx="4">
                   <c:v>HAP4</c:v>
                 </c:pt>
-                <c:pt idx="4">
+                <c:pt idx="5">
                   <c:v>HMO1</c:v>
                 </c:pt>
-                <c:pt idx="5">
+                <c:pt idx="6">
+                  <c:v>MCM1</c:v>
+                </c:pt>
+                <c:pt idx="7">
                   <c:v>MGA2</c:v>
                 </c:pt>
-                <c:pt idx="6">
+                <c:pt idx="8">
                   <c:v>MSN2</c:v>
                 </c:pt>
-                <c:pt idx="7">
+                <c:pt idx="9">
                   <c:v>RDS3</c:v>
                 </c:pt>
-                <c:pt idx="8">
+                <c:pt idx="10">
                   <c:v>SFP1</c:v>
                 </c:pt>
-                <c:pt idx="9">
+                <c:pt idx="11">
                   <c:v>STB5</c:v>
                 </c:pt>
-                <c:pt idx="10">
+                <c:pt idx="12">
                   <c:v>SWI4</c:v>
                 </c:pt>
-                <c:pt idx="11">
+                <c:pt idx="13">
                   <c:v>SWI5</c:v>
                 </c:pt>
-                <c:pt idx="12">
+                <c:pt idx="14">
                   <c:v>YHP1</c:v>
                 </c:pt>
-                <c:pt idx="13">
+                <c:pt idx="15">
                   <c:v>YOX1</c:v>
+                </c:pt>
+                <c:pt idx="16">
+                  <c:v>ZAP1</c:v>
                 </c:pt>
               </c:strCache>
             </c:strRef>
           </c:cat>
           <c:val>
             <c:numRef>
-              <c:f>optimization_diagnostics!$B$8:$B$21</c:f>
+              <c:f>mse_comparison_dcin5!$I$3:$I$19</c:f>
               <c:numCache>
                 <c:formatCode>General</c:formatCode>
-                <c:ptCount val="14"/>
-                <c:pt idx="0">
-                  <c:v>0.722796301432969</c:v>
+                <c:ptCount val="17"/>
+                <c:pt idx="0">
+                  <c:v>0.411320538043566</c:v>
                 </c:pt>
                 <c:pt idx="1">
-                  <c:v>0.471652365539266</c:v>
+                  <c:v>0.845771701780911</c:v>
                 </c:pt>
                 <c:pt idx="2">
-                  <c:v>0.501083326232173</c:v>
+                  <c:v>0.501992303918619</c:v>
                 </c:pt>
                 <c:pt idx="3">
-                  <c:v>2.127443807784427</c:v>
+                  <c:v>0.477325188324043</c:v>
                 </c:pt>
                 <c:pt idx="4">
-                  <c:v>0.64500107184359</c:v>
+                  <c:v>2.101884284529554</c:v>
                 </c:pt>
                 <c:pt idx="5">
-                  <c:v>0.481662378835605</c:v>
+                  <c:v>0.64028441694525</c:v>
                 </c:pt>
                 <c:pt idx="6">
-                  <c:v>0.528876493871981</c:v>
+                  <c:v>1.232337375273702</c:v>
                 </c:pt>
                 <c:pt idx="7">
-                  <c:v>0.23004290427067</c:v>
+                  <c:v>0.532454011461283</c:v>
                 </c:pt>
                 <c:pt idx="8">
-                  <c:v>0.988962937396496</c:v>
+                  <c:v>0.541588997349779</c:v>
                 </c:pt>
                 <c:pt idx="9">
-                  <c:v>1.869963965357812</c:v>
+                  <c:v>0.23177770455563</c:v>
                 </c:pt>
                 <c:pt idx="10">
-                  <c:v>0.262067785115692</c:v>
+                  <c:v>0.994041334161549</c:v>
                 </c:pt>
                 <c:pt idx="11">
-                  <c:v>0.460644501686291</c:v>
+                  <c:v>1.85394626426909</c:v>
                 </c:pt>
                 <c:pt idx="12">
-                  <c:v>0.88318268939703</c:v>
+                  <c:v>0.282293594424155</c:v>
                 </c:pt>
                 <c:pt idx="13">
-                  <c:v>0.430641413252234</c:v>
+                  <c:v>0.451991321518238</c:v>
+                </c:pt>
+                <c:pt idx="14">
+                  <c:v>0.723444414982261</c:v>
+                </c:pt>
+                <c:pt idx="15">
+                  <c:v>0.406136827120828</c:v>
+                </c:pt>
+                <c:pt idx="16">
+                  <c:v>2.059781692109081</c:v>
                 </c:pt>
               </c:numCache>
             </c:numRef>
@@ -4177,7 +3935,7 @@
           <c:order val="1"/>
           <c:tx>
             <c:strRef>
-              <c:f>optimization_diagnostics!$C$7</c:f>
+              <c:f>mse_comparison_dcin5!$J$2</c:f>
               <c:strCache>
                 <c:ptCount val="1"/>
                 <c:pt idx="0">
@@ -4189,101 +3947,119 @@
           <c:invertIfNegative val="0"/>
           <c:cat>
             <c:strRef>
-              <c:f>optimization_diagnostics!$A$8:$A$21</c:f>
+              <c:f>mse_comparison_dcin5!$H$3:$H$19</c:f>
               <c:strCache>
-                <c:ptCount val="14"/>
-                <c:pt idx="0">
+                <c:ptCount val="17"/>
+                <c:pt idx="0">
+                  <c:v>ACE2</c:v>
+                </c:pt>
+                <c:pt idx="1">
                   <c:v>CIN5</c:v>
                 </c:pt>
-                <c:pt idx="1">
+                <c:pt idx="2">
                   <c:v>GCR2</c:v>
                 </c:pt>
-                <c:pt idx="2">
+                <c:pt idx="3">
                   <c:v>GLN3</c:v>
                 </c:pt>
-                <c:pt idx="3">
+                <c:pt idx="4">
                   <c:v>HAP4</c:v>
                 </c:pt>
-                <c:pt idx="4">
+                <c:pt idx="5">
                   <c:v>HMO1</c:v>
                 </c:pt>
-                <c:pt idx="5">
+                <c:pt idx="6">
+                  <c:v>MCM1</c:v>
+                </c:pt>
+                <c:pt idx="7">
                   <c:v>MGA2</c:v>
                 </c:pt>
-                <c:pt idx="6">
+                <c:pt idx="8">
                   <c:v>MSN2</c:v>
                 </c:pt>
-                <c:pt idx="7">
+                <c:pt idx="9">
                   <c:v>RDS3</c:v>
                 </c:pt>
-                <c:pt idx="8">
+                <c:pt idx="10">
                   <c:v>SFP1</c:v>
                 </c:pt>
-                <c:pt idx="9">
+                <c:pt idx="11">
                   <c:v>STB5</c:v>
                 </c:pt>
-                <c:pt idx="10">
+                <c:pt idx="12">
                   <c:v>SWI4</c:v>
                 </c:pt>
-                <c:pt idx="11">
+                <c:pt idx="13">
                   <c:v>SWI5</c:v>
                 </c:pt>
-                <c:pt idx="12">
+                <c:pt idx="14">
                   <c:v>YHP1</c:v>
                 </c:pt>
-                <c:pt idx="13">
+                <c:pt idx="15">
                   <c:v>YOX1</c:v>
+                </c:pt>
+                <c:pt idx="16">
+                  <c:v>ZAP1</c:v>
                 </c:pt>
               </c:strCache>
             </c:strRef>
           </c:cat>
           <c:val>
             <c:numRef>
-              <c:f>optimization_diagnostics!$C$8:$C$21</c:f>
+              <c:f>mse_comparison_dcin5!$J$3:$J$19</c:f>
               <c:numCache>
                 <c:formatCode>General</c:formatCode>
-                <c:ptCount val="14"/>
-                <c:pt idx="0">
-                  <c:v>0.1449642125</c:v>
+                <c:ptCount val="17"/>
+                <c:pt idx="0">
+                  <c:v>0.0992847214059903</c:v>
                 </c:pt>
                 <c:pt idx="1">
-                  <c:v>0.8437907732622</c:v>
+                  <c:v>0.1389393325</c:v>
                 </c:pt>
                 <c:pt idx="2">
-                  <c:v>0.27793107733272</c:v>
+                  <c:v>0.889269757742526</c:v>
                 </c:pt>
                 <c:pt idx="3">
-                  <c:v>1.171059174722969</c:v>
+                  <c:v>0.198700951721269</c:v>
                 </c:pt>
                 <c:pt idx="4">
-                  <c:v>0.651958990905892</c:v>
+                  <c:v>1.183647826891488</c:v>
                 </c:pt>
                 <c:pt idx="5">
-                  <c:v>0.143179050891051</c:v>
+                  <c:v>0.625782206554727</c:v>
                 </c:pt>
                 <c:pt idx="6">
-                  <c:v>0.33402687680756</c:v>
+                  <c:v>0.817620085406046</c:v>
                 </c:pt>
                 <c:pt idx="7">
-                  <c:v>0.482021233727974</c:v>
+                  <c:v>0.129828579881061</c:v>
                 </c:pt>
                 <c:pt idx="8">
-                  <c:v>0.263505708328233</c:v>
+                  <c:v>0.338170556478448</c:v>
                 </c:pt>
                 <c:pt idx="9">
-                  <c:v>0.882053881820877</c:v>
+                  <c:v>0.481540318051162</c:v>
                 </c:pt>
                 <c:pt idx="10">
-                  <c:v>0.791715274610002</c:v>
+                  <c:v>0.260127401014454</c:v>
                 </c:pt>
                 <c:pt idx="11">
-                  <c:v>0.267404891842492</c:v>
+                  <c:v>0.873414290980528</c:v>
                 </c:pt>
                 <c:pt idx="12">
-                  <c:v>0.662672466144309</c:v>
+                  <c:v>0.661970311135113</c:v>
                 </c:pt>
                 <c:pt idx="13">
-                  <c:v>0.757811874505138</c:v>
+                  <c:v>0.227080644692146</c:v>
+                </c:pt>
+                <c:pt idx="14">
+                  <c:v>0.662041868468755</c:v>
+                </c:pt>
+                <c:pt idx="15">
+                  <c:v>0.741316339848555</c:v>
+                </c:pt>
+                <c:pt idx="16">
+                  <c:v>0.663282284912506</c:v>
                 </c:pt>
               </c:numCache>
             </c:numRef>
@@ -4294,7 +4070,7 @@
           <c:order val="2"/>
           <c:tx>
             <c:strRef>
-              <c:f>optimization_diagnostics!$D$7</c:f>
+              <c:f>mse_comparison_dcin5!$K$2</c:f>
               <c:strCache>
                 <c:ptCount val="1"/>
                 <c:pt idx="0">
@@ -4306,101 +4082,119 @@
           <c:invertIfNegative val="0"/>
           <c:cat>
             <c:strRef>
-              <c:f>optimization_diagnostics!$A$8:$A$21</c:f>
+              <c:f>mse_comparison_dcin5!$H$3:$H$19</c:f>
               <c:strCache>
-                <c:ptCount val="14"/>
-                <c:pt idx="0">
+                <c:ptCount val="17"/>
+                <c:pt idx="0">
+                  <c:v>ACE2</c:v>
+                </c:pt>
+                <c:pt idx="1">
                   <c:v>CIN5</c:v>
                 </c:pt>
-                <c:pt idx="1">
+                <c:pt idx="2">
                   <c:v>GCR2</c:v>
                 </c:pt>
-                <c:pt idx="2">
+                <c:pt idx="3">
                   <c:v>GLN3</c:v>
                 </c:pt>
-                <c:pt idx="3">
+                <c:pt idx="4">
                   <c:v>HAP4</c:v>
                 </c:pt>
-                <c:pt idx="4">
+                <c:pt idx="5">
                   <c:v>HMO1</c:v>
                 </c:pt>
-                <c:pt idx="5">
+                <c:pt idx="6">
+                  <c:v>MCM1</c:v>
+                </c:pt>
+                <c:pt idx="7">
                   <c:v>MGA2</c:v>
                 </c:pt>
-                <c:pt idx="6">
+                <c:pt idx="8">
                   <c:v>MSN2</c:v>
                 </c:pt>
-                <c:pt idx="7">
+                <c:pt idx="9">
                   <c:v>RDS3</c:v>
                 </c:pt>
-                <c:pt idx="8">
+                <c:pt idx="10">
                   <c:v>SFP1</c:v>
                 </c:pt>
-                <c:pt idx="9">
+                <c:pt idx="11">
                   <c:v>STB5</c:v>
                 </c:pt>
-                <c:pt idx="10">
+                <c:pt idx="12">
                   <c:v>SWI4</c:v>
                 </c:pt>
-                <c:pt idx="11">
+                <c:pt idx="13">
                   <c:v>SWI5</c:v>
                 </c:pt>
-                <c:pt idx="12">
+                <c:pt idx="14">
                   <c:v>YHP1</c:v>
                 </c:pt>
-                <c:pt idx="13">
+                <c:pt idx="15">
                   <c:v>YOX1</c:v>
+                </c:pt>
+                <c:pt idx="16">
+                  <c:v>ZAP1</c:v>
                 </c:pt>
               </c:strCache>
             </c:strRef>
           </c:cat>
           <c:val>
             <c:numRef>
-              <c:f>optimization_diagnostics!$D$8:$D$21</c:f>
+              <c:f>mse_comparison_dcin5!$K$3:$K$19</c:f>
               <c:numCache>
                 <c:formatCode>General</c:formatCode>
-                <c:ptCount val="14"/>
-                <c:pt idx="0">
-                  <c:v>0.868803248792668</c:v>
+                <c:ptCount val="17"/>
+                <c:pt idx="0">
+                  <c:v>1.261948602936334</c:v>
                 </c:pt>
                 <c:pt idx="1">
-                  <c:v>0.786890430110147</c:v>
+                  <c:v>0.878713872802487</c:v>
                 </c:pt>
                 <c:pt idx="2">
+                  <c:v>0.772752471836118</c:v>
+                </c:pt>
+                <c:pt idx="3">
                   <c:v>0.353261053333333</c:v>
                 </c:pt>
-                <c:pt idx="3">
-                  <c:v>1.522384663672216</c:v>
-                </c:pt>
                 <c:pt idx="4">
-                  <c:v>0.305352427230384</c:v>
+                  <c:v>1.425636687550394</c:v>
                 </c:pt>
                 <c:pt idx="5">
-                  <c:v>0.130605750133767</c:v>
+                  <c:v>0.308122272768119</c:v>
                 </c:pt>
                 <c:pt idx="6">
-                  <c:v>0.845376213993732</c:v>
+                  <c:v>4.128760338869433</c:v>
                 </c:pt>
                 <c:pt idx="7">
-                  <c:v>1.106254952877855</c:v>
+                  <c:v>0.132214349190385</c:v>
                 </c:pt>
                 <c:pt idx="8">
-                  <c:v>0.9653958908835</c:v>
+                  <c:v>0.86498101849668</c:v>
                 </c:pt>
                 <c:pt idx="9">
-                  <c:v>0.349403875122439</c:v>
+                  <c:v>1.072482715368971</c:v>
                 </c:pt>
                 <c:pt idx="10">
-                  <c:v>0.413856534852239</c:v>
+                  <c:v>0.916542210133224</c:v>
                 </c:pt>
                 <c:pt idx="11">
-                  <c:v>0.275315809185295</c:v>
+                  <c:v>0.353959764302183</c:v>
                 </c:pt>
                 <c:pt idx="12">
-                  <c:v>0.804769896080673</c:v>
+                  <c:v>0.444957970170115</c:v>
                 </c:pt>
                 <c:pt idx="13">
-                  <c:v>1.353228209769899</c:v>
+                  <c:v>0.274295430367903</c:v>
+                </c:pt>
+                <c:pt idx="14">
+                  <c:v>0.950572388803823</c:v>
+                </c:pt>
+                <c:pt idx="15">
+                  <c:v>1.491243925144466</c:v>
+                </c:pt>
+                <c:pt idx="16">
+                  <c:v>1.300966547520272</c:v>
                 </c:pt>
               </c:numCache>
             </c:numRef>
@@ -4411,7 +4205,7 @@
           <c:order val="3"/>
           <c:tx>
             <c:strRef>
-              <c:f>optimization_diagnostics!$E$7</c:f>
+              <c:f>mse_comparison_dcin5!$L$2</c:f>
               <c:strCache>
                 <c:ptCount val="1"/>
                 <c:pt idx="0">
@@ -4423,101 +4217,119 @@
           <c:invertIfNegative val="0"/>
           <c:cat>
             <c:strRef>
-              <c:f>optimization_diagnostics!$A$8:$A$21</c:f>
+              <c:f>mse_comparison_dcin5!$H$3:$H$19</c:f>
               <c:strCache>
-                <c:ptCount val="14"/>
-                <c:pt idx="0">
+                <c:ptCount val="17"/>
+                <c:pt idx="0">
+                  <c:v>ACE2</c:v>
+                </c:pt>
+                <c:pt idx="1">
                   <c:v>CIN5</c:v>
                 </c:pt>
-                <c:pt idx="1">
+                <c:pt idx="2">
                   <c:v>GCR2</c:v>
                 </c:pt>
-                <c:pt idx="2">
+                <c:pt idx="3">
                   <c:v>GLN3</c:v>
                 </c:pt>
-                <c:pt idx="3">
+                <c:pt idx="4">
                   <c:v>HAP4</c:v>
                 </c:pt>
-                <c:pt idx="4">
+                <c:pt idx="5">
                   <c:v>HMO1</c:v>
                 </c:pt>
-                <c:pt idx="5">
+                <c:pt idx="6">
+                  <c:v>MCM1</c:v>
+                </c:pt>
+                <c:pt idx="7">
                   <c:v>MGA2</c:v>
                 </c:pt>
-                <c:pt idx="6">
+                <c:pt idx="8">
                   <c:v>MSN2</c:v>
                 </c:pt>
-                <c:pt idx="7">
+                <c:pt idx="9">
                   <c:v>RDS3</c:v>
                 </c:pt>
-                <c:pt idx="8">
+                <c:pt idx="10">
                   <c:v>SFP1</c:v>
                 </c:pt>
-                <c:pt idx="9">
+                <c:pt idx="11">
                   <c:v>STB5</c:v>
                 </c:pt>
-                <c:pt idx="10">
+                <c:pt idx="12">
                   <c:v>SWI4</c:v>
                 </c:pt>
-                <c:pt idx="11">
+                <c:pt idx="13">
                   <c:v>SWI5</c:v>
                 </c:pt>
-                <c:pt idx="12">
+                <c:pt idx="14">
                   <c:v>YHP1</c:v>
                 </c:pt>
-                <c:pt idx="13">
+                <c:pt idx="15">
                   <c:v>YOX1</c:v>
+                </c:pt>
+                <c:pt idx="16">
+                  <c:v>ZAP1</c:v>
                 </c:pt>
               </c:strCache>
             </c:strRef>
           </c:cat>
           <c:val>
             <c:numRef>
-              <c:f>optimization_diagnostics!$E$8:$E$21</c:f>
+              <c:f>mse_comparison_dcin5!$L$3:$L$19</c:f>
               <c:numCache>
                 <c:formatCode>General</c:formatCode>
-                <c:ptCount val="14"/>
-                <c:pt idx="0">
-                  <c:v>1.06705691787989</c:v>
+                <c:ptCount val="17"/>
+                <c:pt idx="0">
+                  <c:v>0.197798678310261</c:v>
                 </c:pt>
                 <c:pt idx="1">
-                  <c:v>0.955850614091442</c:v>
+                  <c:v>0.919000176237511</c:v>
                 </c:pt>
                 <c:pt idx="2">
-                  <c:v>0.190995615343442</c:v>
+                  <c:v>0.858387193803839</c:v>
                 </c:pt>
                 <c:pt idx="3">
-                  <c:v>0.4916199175</c:v>
+                  <c:v>0.192362687626674</c:v>
                 </c:pt>
                 <c:pt idx="4">
-                  <c:v>2.78441041456627</c:v>
+                  <c:v>0.533208381666667</c:v>
                 </c:pt>
                 <c:pt idx="5">
-                  <c:v>0.205377433872493</c:v>
+                  <c:v>2.795444445899142</c:v>
                 </c:pt>
                 <c:pt idx="6">
-                  <c:v>0.24388366415242</c:v>
+                  <c:v>1.241842092099991</c:v>
                 </c:pt>
                 <c:pt idx="7">
-                  <c:v>0.266736258453233</c:v>
+                  <c:v>0.186301445428574</c:v>
                 </c:pt>
                 <c:pt idx="8">
-                  <c:v>0.183628527401954</c:v>
+                  <c:v>0.247234965269412</c:v>
                 </c:pt>
                 <c:pt idx="9">
-                  <c:v>0.178039546563152</c:v>
+                  <c:v>0.215877930707689</c:v>
                 </c:pt>
                 <c:pt idx="10">
-                  <c:v>0.263824911696646</c:v>
+                  <c:v>0.219148085771887</c:v>
                 </c:pt>
                 <c:pt idx="11">
-                  <c:v>0.486440855330612</c:v>
+                  <c:v>0.15193010519539</c:v>
                 </c:pt>
                 <c:pt idx="12">
-                  <c:v>0.45159162324665</c:v>
+                  <c:v>0.157652062429708</c:v>
                 </c:pt>
                 <c:pt idx="13">
-                  <c:v>0.801192946652702</c:v>
+                  <c:v>0.577074884810262</c:v>
+                </c:pt>
+                <c:pt idx="14">
+                  <c:v>0.295675175881401</c:v>
+                </c:pt>
+                <c:pt idx="15">
+                  <c:v>0.710567333003024</c:v>
+                </c:pt>
+                <c:pt idx="16">
+                  <c:v>0.786470832838076</c:v>
                 </c:pt>
               </c:numCache>
             </c:numRef>
@@ -4528,7 +4340,7 @@
           <c:order val="4"/>
           <c:tx>
             <c:strRef>
-              <c:f>optimization_diagnostics!$F$7</c:f>
+              <c:f>mse_comparison_dcin5!$M$2</c:f>
               <c:strCache>
                 <c:ptCount val="1"/>
                 <c:pt idx="0">
@@ -4540,101 +4352,254 @@
           <c:invertIfNegative val="0"/>
           <c:cat>
             <c:strRef>
-              <c:f>optimization_diagnostics!$A$8:$A$21</c:f>
+              <c:f>mse_comparison_dcin5!$H$3:$H$19</c:f>
               <c:strCache>
-                <c:ptCount val="14"/>
-                <c:pt idx="0">
+                <c:ptCount val="17"/>
+                <c:pt idx="0">
+                  <c:v>ACE2</c:v>
+                </c:pt>
+                <c:pt idx="1">
                   <c:v>CIN5</c:v>
                 </c:pt>
-                <c:pt idx="1">
+                <c:pt idx="2">
                   <c:v>GCR2</c:v>
                 </c:pt>
-                <c:pt idx="2">
+                <c:pt idx="3">
                   <c:v>GLN3</c:v>
                 </c:pt>
-                <c:pt idx="3">
+                <c:pt idx="4">
                   <c:v>HAP4</c:v>
                 </c:pt>
-                <c:pt idx="4">
+                <c:pt idx="5">
                   <c:v>HMO1</c:v>
                 </c:pt>
-                <c:pt idx="5">
+                <c:pt idx="6">
+                  <c:v>MCM1</c:v>
+                </c:pt>
+                <c:pt idx="7">
                   <c:v>MGA2</c:v>
                 </c:pt>
-                <c:pt idx="6">
+                <c:pt idx="8">
                   <c:v>MSN2</c:v>
                 </c:pt>
-                <c:pt idx="7">
+                <c:pt idx="9">
                   <c:v>RDS3</c:v>
                 </c:pt>
-                <c:pt idx="8">
+                <c:pt idx="10">
                   <c:v>SFP1</c:v>
                 </c:pt>
-                <c:pt idx="9">
+                <c:pt idx="11">
                   <c:v>STB5</c:v>
                 </c:pt>
-                <c:pt idx="10">
+                <c:pt idx="12">
                   <c:v>SWI4</c:v>
                 </c:pt>
-                <c:pt idx="11">
+                <c:pt idx="13">
                   <c:v>SWI5</c:v>
                 </c:pt>
-                <c:pt idx="12">
+                <c:pt idx="14">
                   <c:v>YHP1</c:v>
                 </c:pt>
-                <c:pt idx="13">
+                <c:pt idx="15">
                   <c:v>YOX1</c:v>
+                </c:pt>
+                <c:pt idx="16">
+                  <c:v>ZAP1</c:v>
                 </c:pt>
               </c:strCache>
             </c:strRef>
           </c:cat>
           <c:val>
             <c:numRef>
-              <c:f>optimization_diagnostics!$F$8:$F$21</c:f>
+              <c:f>mse_comparison_dcin5!$M$3:$M$19</c:f>
               <c:numCache>
                 <c:formatCode>General</c:formatCode>
-                <c:ptCount val="14"/>
-                <c:pt idx="0">
-                  <c:v>0.797075709458288</c:v>
+                <c:ptCount val="17"/>
+                <c:pt idx="0">
+                  <c:v>0.199846144472241</c:v>
                 </c:pt>
                 <c:pt idx="1">
-                  <c:v>0.479130238299297</c:v>
+                  <c:v>0.759404221513909</c:v>
                 </c:pt>
                 <c:pt idx="2">
-                  <c:v>0.28476554166879</c:v>
+                  <c:v>0.497045171344652</c:v>
                 </c:pt>
                 <c:pt idx="3">
-                  <c:v>1.421461527614763</c:v>
+                  <c:v>0.249779442160381</c:v>
                 </c:pt>
                 <c:pt idx="4">
+                  <c:v>1.485298494544057</c:v>
+                </c:pt>
+                <c:pt idx="5">
                   <c:v>0.593595616666667</c:v>
                 </c:pt>
+                <c:pt idx="6">
+                  <c:v>3.12607711412136</c:v>
+                </c:pt>
+                <c:pt idx="7">
+                  <c:v>0.298201977764395</c:v>
+                </c:pt>
+                <c:pt idx="8">
+                  <c:v>0.477302943379906</c:v>
+                </c:pt>
+                <c:pt idx="9">
+                  <c:v>1.790149960974662</c:v>
+                </c:pt>
+                <c:pt idx="10">
+                  <c:v>1.080877286301819</c:v>
+                </c:pt>
+                <c:pt idx="11">
+                  <c:v>0.529463493612634</c:v>
+                </c:pt>
+                <c:pt idx="12">
+                  <c:v>0.248228445582492</c:v>
+                </c:pt>
+                <c:pt idx="13">
+                  <c:v>0.23381860952912</c:v>
+                </c:pt>
+                <c:pt idx="14">
+                  <c:v>0.301836724650599</c:v>
+                </c:pt>
+                <c:pt idx="15">
+                  <c:v>0.664446494403275</c:v>
+                </c:pt>
+                <c:pt idx="16">
+                  <c:v>0.478156570855901</c:v>
+                </c:pt>
+              </c:numCache>
+            </c:numRef>
+          </c:val>
+        </c:ser>
+        <c:ser>
+          <c:idx val="5"/>
+          <c:order val="5"/>
+          <c:tx>
+            <c:strRef>
+              <c:f>mse_comparison_dcin5!$N$2</c:f>
+              <c:strCache>
+                <c:ptCount val="1"/>
+                <c:pt idx="0">
+                  <c:v>ZAP1 MSE</c:v>
+                </c:pt>
+              </c:strCache>
+            </c:strRef>
+          </c:tx>
+          <c:invertIfNegative val="0"/>
+          <c:cat>
+            <c:strRef>
+              <c:f>mse_comparison_dcin5!$H$3:$H$19</c:f>
+              <c:strCache>
+                <c:ptCount val="17"/>
+                <c:pt idx="0">
+                  <c:v>ACE2</c:v>
+                </c:pt>
+                <c:pt idx="1">
+                  <c:v>CIN5</c:v>
+                </c:pt>
+                <c:pt idx="2">
+                  <c:v>GCR2</c:v>
+                </c:pt>
+                <c:pt idx="3">
+                  <c:v>GLN3</c:v>
+                </c:pt>
+                <c:pt idx="4">
+                  <c:v>HAP4</c:v>
+                </c:pt>
                 <c:pt idx="5">
-                  <c:v>0.295700559726016</c:v>
+                  <c:v>HMO1</c:v>
                 </c:pt>
                 <c:pt idx="6">
-                  <c:v>0.444605025134897</c:v>
+                  <c:v>MCM1</c:v>
                 </c:pt>
                 <c:pt idx="7">
-                  <c:v>1.835185132381002</c:v>
+                  <c:v>MGA2</c:v>
                 </c:pt>
                 <c:pt idx="8">
-                  <c:v>1.161156936772133</c:v>
+                  <c:v>MSN2</c:v>
                 </c:pt>
                 <c:pt idx="9">
-                  <c:v>0.53753662840439</c:v>
+                  <c:v>RDS3</c:v>
                 </c:pt>
                 <c:pt idx="10">
-                  <c:v>0.255804481827353</c:v>
+                  <c:v>SFP1</c:v>
                 </c:pt>
                 <c:pt idx="11">
-                  <c:v>0.27140737279938</c:v>
+                  <c:v>STB5</c:v>
                 </c:pt>
                 <c:pt idx="12">
-                  <c:v>0.360283645617838</c:v>
+                  <c:v>SWI4</c:v>
                 </c:pt>
                 <c:pt idx="13">
-                  <c:v>0.661193185799969</c:v>
+                  <c:v>SWI5</c:v>
+                </c:pt>
+                <c:pt idx="14">
+                  <c:v>YHP1</c:v>
+                </c:pt>
+                <c:pt idx="15">
+                  <c:v>YOX1</c:v>
+                </c:pt>
+                <c:pt idx="16">
+                  <c:v>ZAP1</c:v>
+                </c:pt>
+              </c:strCache>
+            </c:strRef>
+          </c:cat>
+          <c:val>
+            <c:numRef>
+              <c:f>mse_comparison_dcin5!$N$3:$N$19</c:f>
+              <c:numCache>
+                <c:formatCode>General</c:formatCode>
+                <c:ptCount val="17"/>
+                <c:pt idx="0">
+                  <c:v>0.850252951034045</c:v>
+                </c:pt>
+                <c:pt idx="1">
+                  <c:v>0.654608305705414</c:v>
+                </c:pt>
+                <c:pt idx="2">
+                  <c:v>0.232852761733475</c:v>
+                </c:pt>
+                <c:pt idx="3">
+                  <c:v>0.162253066039771</c:v>
+                </c:pt>
+                <c:pt idx="4">
+                  <c:v>0.598531288176671</c:v>
+                </c:pt>
+                <c:pt idx="5">
+                  <c:v>0.584332624283594</c:v>
+                </c:pt>
+                <c:pt idx="6">
+                  <c:v>3.739998244700803</c:v>
+                </c:pt>
+                <c:pt idx="7">
+                  <c:v>0.383648279628723</c:v>
+                </c:pt>
+                <c:pt idx="8">
+                  <c:v>0.292957299957133</c:v>
+                </c:pt>
+                <c:pt idx="9">
+                  <c:v>0.914959528665258</c:v>
+                </c:pt>
+                <c:pt idx="10">
+                  <c:v>0.331897419989214</c:v>
+                </c:pt>
+                <c:pt idx="11">
+                  <c:v>1.333338712602204</c:v>
+                </c:pt>
+                <c:pt idx="12">
+                  <c:v>0.257173668845343</c:v>
+                </c:pt>
+                <c:pt idx="13">
+                  <c:v>0.286280148823619</c:v>
+                </c:pt>
+                <c:pt idx="14">
+                  <c:v>0.480908408788092</c:v>
+                </c:pt>
+                <c:pt idx="15">
+                  <c:v>0.4958165385531</c:v>
+                </c:pt>
+                <c:pt idx="16">
+                  <c:v>3.159033750833333</c:v>
                 </c:pt>
               </c:numCache>
             </c:numRef>
@@ -4649,11 +4614,11 @@
           <c:showBubbleSize val="0"/>
         </c:dLbls>
         <c:gapWidth val="150"/>
-        <c:axId val="2090154008"/>
-        <c:axId val="2047283432"/>
+        <c:axId val="-2104341256"/>
+        <c:axId val="-2105266824"/>
       </c:barChart>
       <c:catAx>
-        <c:axId val="2090154008"/>
+        <c:axId val="-2104341256"/>
         <c:scaling>
           <c:orientation val="minMax"/>
         </c:scaling>
@@ -4662,17 +4627,7 @@
         <c:majorTickMark val="out"/>
         <c:minorTickMark val="none"/>
         <c:tickLblPos val="nextTo"/>
-        <c:txPr>
-          <a:bodyPr/>
-          <a:lstStyle/>
-          <a:p>
-            <a:pPr>
-              <a:defRPr b="1" i="0"/>
-            </a:pPr>
-            <a:endParaRPr lang="en-US"/>
-          </a:p>
-        </c:txPr>
-        <c:crossAx val="2047283432"/>
+        <c:crossAx val="-2105266824"/>
         <c:crosses val="autoZero"/>
         <c:auto val="1"/>
         <c:lblAlgn val="ctr"/>
@@ -4680,7 +4635,7 @@
         <c:noMultiLvlLbl val="0"/>
       </c:catAx>
       <c:valAx>
-        <c:axId val="2047283432"/>
+        <c:axId val="-2105266824"/>
         <c:scaling>
           <c:orientation val="minMax"/>
         </c:scaling>
@@ -4691,7 +4646,7 @@
         <c:majorTickMark val="out"/>
         <c:minorTickMark val="none"/>
         <c:tickLblPos val="nextTo"/>
-        <c:crossAx val="2090154008"/>
+        <c:crossAx val="-2104341256"/>
         <c:crosses val="autoZero"/>
         <c:crossBetween val="between"/>
       </c:valAx>
@@ -4700,16 +4655,6 @@
       <c:legendPos val="r"/>
       <c:layout/>
       <c:overlay val="0"/>
-      <c:txPr>
-        <a:bodyPr/>
-        <a:lstStyle/>
-        <a:p>
-          <a:pPr>
-            <a:defRPr b="1" i="0"/>
-          </a:pPr>
-          <a:endParaRPr lang="en-US"/>
-        </a:p>
-      </c:txPr>
     </c:legend>
     <c:plotVisOnly val="1"/>
     <c:dispBlanksAs val="gap"/>
@@ -4720,8 +4665,9 @@
     <a:lstStyle/>
     <a:p>
       <a:pPr>
-        <a:defRPr sz="1100">
+        <a:defRPr sz="1100" b="1">
           <a:latin typeface="Arial"/>
+          <a:cs typeface="Arial"/>
         </a:defRPr>
       </a:pPr>
       <a:endParaRPr lang="en-US"/>
@@ -5348,11 +5294,11 @@
           <c:showBubbleSize val="0"/>
         </c:dLbls>
         <c:gapWidth val="150"/>
-        <c:axId val="2130742568"/>
-        <c:axId val="2133101128"/>
+        <c:axId val="-2048940600"/>
+        <c:axId val="-2048937544"/>
       </c:barChart>
       <c:catAx>
-        <c:axId val="2130742568"/>
+        <c:axId val="-2048940600"/>
         <c:scaling>
           <c:orientation val="minMax"/>
         </c:scaling>
@@ -5361,7 +5307,7 @@
         <c:majorTickMark val="out"/>
         <c:minorTickMark val="none"/>
         <c:tickLblPos val="nextTo"/>
-        <c:crossAx val="2133101128"/>
+        <c:crossAx val="-2048937544"/>
         <c:crosses val="autoZero"/>
         <c:auto val="1"/>
         <c:lblAlgn val="ctr"/>
@@ -5369,7 +5315,7 @@
         <c:noMultiLvlLbl val="0"/>
       </c:catAx>
       <c:valAx>
-        <c:axId val="2133101128"/>
+        <c:axId val="-2048937544"/>
         <c:scaling>
           <c:orientation val="minMax"/>
         </c:scaling>
@@ -5380,7 +5326,7 @@
         <c:majorTickMark val="out"/>
         <c:minorTickMark val="none"/>
         <c:tickLblPos val="nextTo"/>
-        <c:crossAx val="2130742568"/>
+        <c:crossAx val="-2048940600"/>
         <c:crosses val="autoZero"/>
         <c:crossBetween val="between"/>
       </c:valAx>
@@ -6181,11 +6127,11 @@
           <c:showBubbleSize val="0"/>
         </c:dLbls>
         <c:gapWidth val="150"/>
-        <c:axId val="2136745064"/>
-        <c:axId val="2136748200"/>
+        <c:axId val="-2103693864"/>
+        <c:axId val="-2104007608"/>
       </c:barChart>
       <c:catAx>
-        <c:axId val="2136745064"/>
+        <c:axId val="-2103693864"/>
         <c:scaling>
           <c:orientation val="minMax"/>
         </c:scaling>
@@ -6194,7 +6140,7 @@
         <c:majorTickMark val="out"/>
         <c:minorTickMark val="none"/>
         <c:tickLblPos val="nextTo"/>
-        <c:crossAx val="2136748200"/>
+        <c:crossAx val="-2104007608"/>
         <c:crosses val="autoZero"/>
         <c:auto val="1"/>
         <c:lblAlgn val="ctr"/>
@@ -6202,7 +6148,7 @@
         <c:noMultiLvlLbl val="0"/>
       </c:catAx>
       <c:valAx>
-        <c:axId val="2136748200"/>
+        <c:axId val="-2104007608"/>
         <c:scaling>
           <c:orientation val="minMax"/>
         </c:scaling>
@@ -6213,7 +6159,7 @@
         <c:majorTickMark val="out"/>
         <c:minorTickMark val="none"/>
         <c:tickLblPos val="nextTo"/>
-        <c:crossAx val="2136745064"/>
+        <c:crossAx val="-2103693864"/>
         <c:crosses val="autoZero"/>
         <c:crossBetween val="between"/>
       </c:valAx>
@@ -7050,11 +6996,11 @@
           <c:showBubbleSize val="0"/>
         </c:dLbls>
         <c:gapWidth val="150"/>
-        <c:axId val="2133640632"/>
-        <c:axId val="2133643928"/>
+        <c:axId val="-2053144504"/>
+        <c:axId val="-2097976104"/>
       </c:barChart>
       <c:catAx>
-        <c:axId val="2133640632"/>
+        <c:axId val="-2053144504"/>
         <c:scaling>
           <c:orientation val="minMax"/>
         </c:scaling>
@@ -7063,7 +7009,7 @@
         <c:majorTickMark val="out"/>
         <c:minorTickMark val="none"/>
         <c:tickLblPos val="nextTo"/>
-        <c:crossAx val="2133643928"/>
+        <c:crossAx val="-2097976104"/>
         <c:crosses val="autoZero"/>
         <c:auto val="1"/>
         <c:lblAlgn val="ctr"/>
@@ -7071,7 +7017,7 @@
         <c:noMultiLvlLbl val="0"/>
       </c:catAx>
       <c:valAx>
-        <c:axId val="2133643928"/>
+        <c:axId val="-2097976104"/>
         <c:scaling>
           <c:orientation val="minMax"/>
         </c:scaling>
@@ -7082,7 +7028,7 @@
         <c:majorTickMark val="out"/>
         <c:minorTickMark val="none"/>
         <c:tickLblPos val="nextTo"/>
-        <c:crossAx val="2133640632"/>
+        <c:crossAx val="-2053144504"/>
         <c:crosses val="autoZero"/>
         <c:crossBetween val="between"/>
       </c:valAx>
@@ -7296,7 +7242,7 @@
           <a:p>
             <a:fld id="{7DD5E95C-6FA8-4669-BE0B-DCF3DCE79358}" type="datetimeFigureOut">
               <a:rPr lang="en-US" smtClean="0"/>
-              <a:t>12/5/16</a:t>
+              <a:t>12/7/16</a:t>
             </a:fld>
             <a:endParaRPr lang="en-US"/>
           </a:p>
@@ -7466,7 +7412,7 @@
           <a:p>
             <a:fld id="{7DD5E95C-6FA8-4669-BE0B-DCF3DCE79358}" type="datetimeFigureOut">
               <a:rPr lang="en-US" smtClean="0"/>
-              <a:t>12/5/16</a:t>
+              <a:t>12/7/16</a:t>
             </a:fld>
             <a:endParaRPr lang="en-US"/>
           </a:p>
@@ -7646,7 +7592,7 @@
           <a:p>
             <a:fld id="{7DD5E95C-6FA8-4669-BE0B-DCF3DCE79358}" type="datetimeFigureOut">
               <a:rPr lang="en-US" smtClean="0"/>
-              <a:t>12/5/16</a:t>
+              <a:t>12/7/16</a:t>
             </a:fld>
             <a:endParaRPr lang="en-US"/>
           </a:p>
@@ -7816,7 +7762,7 @@
           <a:p>
             <a:fld id="{7DD5E95C-6FA8-4669-BE0B-DCF3DCE79358}" type="datetimeFigureOut">
               <a:rPr lang="en-US" smtClean="0"/>
-              <a:t>12/5/16</a:t>
+              <a:t>12/7/16</a:t>
             </a:fld>
             <a:endParaRPr lang="en-US"/>
           </a:p>
@@ -8062,7 +8008,7 @@
           <a:p>
             <a:fld id="{7DD5E95C-6FA8-4669-BE0B-DCF3DCE79358}" type="datetimeFigureOut">
               <a:rPr lang="en-US" smtClean="0"/>
-              <a:t>12/5/16</a:t>
+              <a:t>12/7/16</a:t>
             </a:fld>
             <a:endParaRPr lang="en-US"/>
           </a:p>
@@ -8350,7 +8296,7 @@
           <a:p>
             <a:fld id="{7DD5E95C-6FA8-4669-BE0B-DCF3DCE79358}" type="datetimeFigureOut">
               <a:rPr lang="en-US" smtClean="0"/>
-              <a:t>12/5/16</a:t>
+              <a:t>12/7/16</a:t>
             </a:fld>
             <a:endParaRPr lang="en-US"/>
           </a:p>
@@ -8772,7 +8718,7 @@
           <a:p>
             <a:fld id="{7DD5E95C-6FA8-4669-BE0B-DCF3DCE79358}" type="datetimeFigureOut">
               <a:rPr lang="en-US" smtClean="0"/>
-              <a:t>12/5/16</a:t>
+              <a:t>12/7/16</a:t>
             </a:fld>
             <a:endParaRPr lang="en-US"/>
           </a:p>
@@ -8890,7 +8836,7 @@
           <a:p>
             <a:fld id="{7DD5E95C-6FA8-4669-BE0B-DCF3DCE79358}" type="datetimeFigureOut">
               <a:rPr lang="en-US" smtClean="0"/>
-              <a:t>12/5/16</a:t>
+              <a:t>12/7/16</a:t>
             </a:fld>
             <a:endParaRPr lang="en-US"/>
           </a:p>
@@ -8985,7 +8931,7 @@
           <a:p>
             <a:fld id="{7DD5E95C-6FA8-4669-BE0B-DCF3DCE79358}" type="datetimeFigureOut">
               <a:rPr lang="en-US" smtClean="0"/>
-              <a:t>12/5/16</a:t>
+              <a:t>12/7/16</a:t>
             </a:fld>
             <a:endParaRPr lang="en-US"/>
           </a:p>
@@ -9262,7 +9208,7 @@
           <a:p>
             <a:fld id="{7DD5E95C-6FA8-4669-BE0B-DCF3DCE79358}" type="datetimeFigureOut">
               <a:rPr lang="en-US" smtClean="0"/>
-              <a:t>12/5/16</a:t>
+              <a:t>12/7/16</a:t>
             </a:fld>
             <a:endParaRPr lang="en-US"/>
           </a:p>
@@ -9515,7 +9461,7 @@
           <a:p>
             <a:fld id="{7DD5E95C-6FA8-4669-BE0B-DCF3DCE79358}" type="datetimeFigureOut">
               <a:rPr lang="en-US" smtClean="0"/>
-              <a:t>12/5/16</a:t>
+              <a:t>12/7/16</a:t>
             </a:fld>
             <a:endParaRPr lang="en-US"/>
           </a:p>
@@ -9728,7 +9674,7 @@
           <a:p>
             <a:fld id="{7DD5E95C-6FA8-4669-BE0B-DCF3DCE79358}" type="datetimeFigureOut">
               <a:rPr lang="en-US" smtClean="0"/>
-              <a:t>12/5/16</a:t>
+              <a:t>12/7/16</a:t>
             </a:fld>
             <a:endParaRPr lang="en-US"/>
           </a:p>
@@ -10166,28 +10112,8 @@
                 <a:latin typeface="Arial" panose="020B0604020202020204" pitchFamily="34" charset="0"/>
                 <a:cs typeface="Arial" panose="020B0604020202020204" pitchFamily="34" charset="0"/>
               </a:rPr>
-              <a:t>Brandon </a:t>
+              <a:t>Brandon Klein</a:t>
             </a:r>
-            <a:r>
-              <a:rPr lang="en-US" sz="2000" dirty="0" smtClean="0">
-                <a:latin typeface="Arial" panose="020B0604020202020204" pitchFamily="34" charset="0"/>
-                <a:cs typeface="Arial" panose="020B0604020202020204" pitchFamily="34" charset="0"/>
-              </a:rPr>
-              <a:t>Klein</a:t>
-            </a:r>
-          </a:p>
-          <a:p>
-            <a:r>
-              <a:rPr lang="en-US" sz="2000" dirty="0" smtClean="0">
-                <a:latin typeface="Arial" panose="020B0604020202020204" pitchFamily="34" charset="0"/>
-                <a:cs typeface="Arial" panose="020B0604020202020204" pitchFamily="34" charset="0"/>
-              </a:rPr>
-              <a:t>Natalie Williams</a:t>
-            </a:r>
-            <a:endParaRPr lang="en-US" sz="2000" dirty="0">
-              <a:latin typeface="Arial" panose="020B0604020202020204" pitchFamily="34" charset="0"/>
-              <a:cs typeface="Arial" panose="020B0604020202020204" pitchFamily="34" charset="0"/>
-            </a:endParaRPr>
           </a:p>
           <a:p>
             <a:endParaRPr lang="en-US" sz="2000" dirty="0">
@@ -10247,6 +10173,30 @@
           <a:chExt cx="0" cy="0"/>
         </a:xfrm>
       </p:grpSpPr>
+      <p:graphicFrame>
+        <p:nvGraphicFramePr>
+          <p:cNvPr id="9" name="Chart 8"/>
+          <p:cNvGraphicFramePr>
+            <a:graphicFrameLocks/>
+          </p:cNvGraphicFramePr>
+          <p:nvPr>
+            <p:extLst>
+              <p:ext uri="{D42A27DB-BD31-4B8C-83A1-F6EECF244321}">
+                <p14:modId xmlns:p14="http://schemas.microsoft.com/office/powerpoint/2010/main" val="2006218878"/>
+              </p:ext>
+            </p:extLst>
+          </p:nvPr>
+        </p:nvGraphicFramePr>
+        <p:xfrm>
+          <a:off x="5393" y="1143000"/>
+          <a:ext cx="9144000" cy="5715000"/>
+        </p:xfrm>
+        <a:graphic>
+          <a:graphicData uri="http://schemas.openxmlformats.org/drawingml/2006/chart">
+            <c:chart xmlns:c="http://schemas.openxmlformats.org/drawingml/2006/chart" xmlns:r="http://schemas.openxmlformats.org/officeDocument/2006/relationships" r:id="rId2"/>
+          </a:graphicData>
+        </a:graphic>
+      </p:graphicFrame>
       <p:sp>
         <p:nvSpPr>
           <p:cNvPr id="2" name="Title 1"/>
@@ -10297,7 +10247,7 @@
         </p:nvSpPr>
         <p:spPr>
           <a:xfrm rot="2414868">
-            <a:off x="2893214" y="6261240"/>
+            <a:off x="2960331" y="6261240"/>
             <a:ext cx="242455" cy="553212"/>
           </a:xfrm>
           <a:prstGeom prst="ellipse">
@@ -10343,7 +10293,7 @@
         </p:nvSpPr>
         <p:spPr>
           <a:xfrm rot="2414868">
-            <a:off x="7815755" y="6284115"/>
+            <a:off x="7157544" y="6284115"/>
             <a:ext cx="266701" cy="553212"/>
           </a:xfrm>
           <a:prstGeom prst="ellipse">
@@ -10435,7 +10385,7 @@
         </p:nvSpPr>
         <p:spPr>
           <a:xfrm>
-            <a:off x="8340090" y="3352800"/>
+            <a:off x="7696200" y="3014990"/>
             <a:ext cx="922020" cy="261610"/>
           </a:xfrm>
           <a:prstGeom prst="rect">
@@ -10463,30 +10413,6 @@
           </a:p>
         </p:txBody>
       </p:sp>
-      <p:graphicFrame>
-        <p:nvGraphicFramePr>
-          <p:cNvPr id="9" name="Chart 8"/>
-          <p:cNvGraphicFramePr>
-            <a:graphicFrameLocks/>
-          </p:cNvGraphicFramePr>
-          <p:nvPr>
-            <p:extLst>
-              <p:ext uri="{D42A27DB-BD31-4B8C-83A1-F6EECF244321}">
-                <p14:modId xmlns:p14="http://schemas.microsoft.com/office/powerpoint/2010/main" val="1256050566"/>
-              </p:ext>
-            </p:extLst>
-          </p:nvPr>
-        </p:nvGraphicFramePr>
-        <p:xfrm>
-          <a:off x="45720" y="1289304"/>
-          <a:ext cx="9098280" cy="5568696"/>
-        </p:xfrm>
-        <a:graphic>
-          <a:graphicData uri="http://schemas.openxmlformats.org/drawingml/2006/chart">
-            <c:chart xmlns:c="http://schemas.openxmlformats.org/drawingml/2006/chart" xmlns:r="http://schemas.openxmlformats.org/officeDocument/2006/relationships" r:id="rId2"/>
-          </a:graphicData>
-        </a:graphic>
-      </p:graphicFrame>
     </p:spTree>
     <p:extLst>
       <p:ext uri="{BB962C8B-B14F-4D97-AF65-F5344CB8AC3E}">
@@ -10524,6 +10450,30 @@
           <a:chExt cx="0" cy="0"/>
         </a:xfrm>
       </p:grpSpPr>
+      <p:graphicFrame>
+        <p:nvGraphicFramePr>
+          <p:cNvPr id="9" name="Chart 8"/>
+          <p:cNvGraphicFramePr>
+            <a:graphicFrameLocks/>
+          </p:cNvGraphicFramePr>
+          <p:nvPr>
+            <p:extLst>
+              <p:ext uri="{D42A27DB-BD31-4B8C-83A1-F6EECF244321}">
+                <p14:modId xmlns:p14="http://schemas.microsoft.com/office/powerpoint/2010/main" val="1905838435"/>
+              </p:ext>
+            </p:extLst>
+          </p:nvPr>
+        </p:nvGraphicFramePr>
+        <p:xfrm>
+          <a:off x="0" y="1143000"/>
+          <a:ext cx="9144000" cy="5715000"/>
+        </p:xfrm>
+        <a:graphic>
+          <a:graphicData uri="http://schemas.openxmlformats.org/drawingml/2006/chart">
+            <c:chart xmlns:c="http://schemas.openxmlformats.org/drawingml/2006/chart" xmlns:r="http://schemas.openxmlformats.org/officeDocument/2006/relationships" r:id="rId2"/>
+          </a:graphicData>
+        </a:graphic>
+      </p:graphicFrame>
       <p:sp>
         <p:nvSpPr>
           <p:cNvPr id="2" name="Title 1"/>
@@ -10568,59 +10518,13 @@
       </p:sp>
       <p:sp>
         <p:nvSpPr>
-          <p:cNvPr id="4" name="Oval 3"/>
-          <p:cNvSpPr/>
-          <p:nvPr/>
-        </p:nvSpPr>
-        <p:spPr>
-          <a:xfrm rot="2414868">
-            <a:off x="2893214" y="4539348"/>
-            <a:ext cx="242455" cy="553212"/>
-          </a:xfrm>
-          <a:prstGeom prst="ellipse">
-            <a:avLst/>
-          </a:prstGeom>
-          <a:noFill/>
-          <a:ln>
-            <a:solidFill>
-              <a:srgbClr val="FF0000"/>
-            </a:solidFill>
-          </a:ln>
-        </p:spPr>
-        <p:style>
-          <a:lnRef idx="2">
-            <a:schemeClr val="accent1">
-              <a:shade val="50000"/>
-            </a:schemeClr>
-          </a:lnRef>
-          <a:fillRef idx="1">
-            <a:schemeClr val="accent1"/>
-          </a:fillRef>
-          <a:effectRef idx="0">
-            <a:schemeClr val="accent1"/>
-          </a:effectRef>
-          <a:fontRef idx="minor">
-            <a:schemeClr val="lt1"/>
-          </a:fontRef>
-        </p:style>
-        <p:txBody>
-          <a:bodyPr rtlCol="0" anchor="ctr"/>
-          <a:lstStyle/>
-          <a:p>
-            <a:pPr algn="ctr"/>
-            <a:endParaRPr lang="en-US"/>
-          </a:p>
-        </p:txBody>
-      </p:sp>
-      <p:sp>
-        <p:nvSpPr>
           <p:cNvPr id="5" name="Oval 4"/>
           <p:cNvSpPr/>
           <p:nvPr/>
         </p:nvSpPr>
         <p:spPr>
           <a:xfrm rot="2414868">
-            <a:off x="7906168" y="4583686"/>
+            <a:off x="7167577" y="4583686"/>
             <a:ext cx="242455" cy="502920"/>
           </a:xfrm>
           <a:prstGeom prst="ellipse">
@@ -10712,7 +10616,7 @@
         </p:nvSpPr>
         <p:spPr>
           <a:xfrm>
-            <a:off x="8404479" y="3352800"/>
+            <a:off x="7696200" y="3048000"/>
             <a:ext cx="1014222" cy="261610"/>
           </a:xfrm>
           <a:prstGeom prst="rect">
@@ -10740,30 +10644,52 @@
           </a:p>
         </p:txBody>
       </p:sp>
-      <p:graphicFrame>
-        <p:nvGraphicFramePr>
-          <p:cNvPr id="9" name="Chart 8"/>
-          <p:cNvGraphicFramePr>
-            <a:graphicFrameLocks/>
-          </p:cNvGraphicFramePr>
-          <p:nvPr>
-            <p:extLst>
-              <p:ext uri="{D42A27DB-BD31-4B8C-83A1-F6EECF244321}">
-                <p14:modId xmlns:p14="http://schemas.microsoft.com/office/powerpoint/2010/main" val="2271020796"/>
-              </p:ext>
-            </p:extLst>
-          </p:nvPr>
-        </p:nvGraphicFramePr>
-        <p:xfrm>
-          <a:off x="0" y="1219200"/>
-          <a:ext cx="9144000" cy="5638800"/>
-        </p:xfrm>
-        <a:graphic>
-          <a:graphicData uri="http://schemas.openxmlformats.org/drawingml/2006/chart">
-            <c:chart xmlns:c="http://schemas.openxmlformats.org/drawingml/2006/chart" xmlns:r="http://schemas.openxmlformats.org/officeDocument/2006/relationships" r:id="rId2"/>
-          </a:graphicData>
-        </a:graphic>
-      </p:graphicFrame>
+      <p:sp>
+        <p:nvSpPr>
+          <p:cNvPr id="10" name="Oval 9"/>
+          <p:cNvSpPr/>
+          <p:nvPr/>
+        </p:nvSpPr>
+        <p:spPr>
+          <a:xfrm rot="2414868">
+            <a:off x="2648368" y="4583686"/>
+            <a:ext cx="242455" cy="502920"/>
+          </a:xfrm>
+          <a:prstGeom prst="ellipse">
+            <a:avLst/>
+          </a:prstGeom>
+          <a:noFill/>
+          <a:ln>
+            <a:solidFill>
+              <a:srgbClr val="FF0000"/>
+            </a:solidFill>
+          </a:ln>
+        </p:spPr>
+        <p:style>
+          <a:lnRef idx="2">
+            <a:schemeClr val="accent1">
+              <a:shade val="50000"/>
+            </a:schemeClr>
+          </a:lnRef>
+          <a:fillRef idx="1">
+            <a:schemeClr val="accent1"/>
+          </a:fillRef>
+          <a:effectRef idx="0">
+            <a:schemeClr val="accent1"/>
+          </a:effectRef>
+          <a:fontRef idx="minor">
+            <a:schemeClr val="lt1"/>
+          </a:fontRef>
+        </p:style>
+        <p:txBody>
+          <a:bodyPr rtlCol="0" anchor="ctr"/>
+          <a:lstStyle/>
+          <a:p>
+            <a:pPr algn="ctr"/>
+            <a:endParaRPr lang="en-US"/>
+          </a:p>
+        </p:txBody>
+      </p:sp>
     </p:spTree>
     <p:extLst>
       <p:ext uri="{BB962C8B-B14F-4D97-AF65-F5344CB8AC3E}">
@@ -10928,56 +10854,22 @@
           <a:chExt cx="0" cy="0"/>
         </a:xfrm>
       </p:grpSpPr>
-      <p:sp>
-        <p:nvSpPr>
-          <p:cNvPr id="2" name="Title 1"/>
-          <p:cNvSpPr>
-            <a:spLocks noGrp="1"/>
-          </p:cNvSpPr>
-          <p:nvPr>
-            <p:ph type="title"/>
-          </p:nvPr>
-        </p:nvSpPr>
-        <p:spPr>
-          <a:xfrm>
-            <a:off x="533400" y="0"/>
-            <a:ext cx="8229600" cy="1143000"/>
-          </a:xfrm>
-        </p:spPr>
-        <p:txBody>
-          <a:bodyPr>
-            <a:normAutofit fontScale="90000"/>
-          </a:bodyPr>
-          <a:lstStyle/>
-          <a:p>
-            <a:r>
-              <a:rPr lang="en-US" dirty="0"/>
-              <a:t>MSE Comparisons Between Strains in the </a:t>
-            </a:r>
-            <a:r>
-              <a:rPr lang="en-US" dirty="0" smtClean="0"/>
-              <a:t>17 gene, 32 edge dCIN5 Network</a:t>
-            </a:r>
-            <a:endParaRPr lang="en-US" dirty="0"/>
-          </a:p>
-        </p:txBody>
-      </p:sp>
       <p:graphicFrame>
         <p:nvGraphicFramePr>
-          <p:cNvPr id="4" name="Chart 3"/>
+          <p:cNvPr id="7" name="Chart 6"/>
           <p:cNvGraphicFramePr>
             <a:graphicFrameLocks/>
           </p:cNvGraphicFramePr>
           <p:nvPr>
             <p:extLst>
               <p:ext uri="{D42A27DB-BD31-4B8C-83A1-F6EECF244321}">
-                <p14:modId xmlns:p14="http://schemas.microsoft.com/office/powerpoint/2010/main" val="3193404508"/>
+                <p14:modId xmlns:p14="http://schemas.microsoft.com/office/powerpoint/2010/main" val="2993012438"/>
               </p:ext>
             </p:extLst>
           </p:nvPr>
         </p:nvGraphicFramePr>
         <p:xfrm>
-          <a:off x="0" y="1143000"/>
+          <a:off x="-18939" y="1143000"/>
           <a:ext cx="9144000" cy="5715000"/>
         </p:xfrm>
         <a:graphic>
@@ -10988,14 +10880,14 @@
       </p:graphicFrame>
       <p:sp>
         <p:nvSpPr>
-          <p:cNvPr id="5" name="TextBox 4"/>
+          <p:cNvPr id="8" name="TextBox 7"/>
           <p:cNvSpPr txBox="1"/>
           <p:nvPr/>
         </p:nvSpPr>
         <p:spPr>
           <a:xfrm>
-            <a:off x="8001000" y="2968823"/>
-            <a:ext cx="990600" cy="307777"/>
+            <a:off x="8001000" y="3167390"/>
+            <a:ext cx="1014222" cy="261610"/>
           </a:xfrm>
           <a:prstGeom prst="rect">
             <a:avLst/>
@@ -11009,29 +10901,82 @@
           <a:lstStyle/>
           <a:p>
             <a:r>
-              <a:rPr lang="en-US" sz="1400" b="1" u="sng" dirty="0" smtClean="0">
+              <a:rPr lang="en-US" sz="1100" b="1" u="sng" dirty="0" smtClean="0">
                 <a:latin typeface="Arial"/>
                 <a:cs typeface="Arial"/>
               </a:rPr>
-              <a:t>Strain</a:t>
+              <a:t>Strain:</a:t>
             </a:r>
-            <a:endParaRPr lang="en-US" sz="1400" b="1" u="sng" dirty="0">
+            <a:endParaRPr lang="en-US" sz="1100" b="1" u="sng" dirty="0">
               <a:latin typeface="Arial"/>
               <a:cs typeface="Arial"/>
             </a:endParaRPr>
+          </a:p>
+        </p:txBody>
+      </p:sp>
+      <p:sp>
+        <p:nvSpPr>
+          <p:cNvPr id="6" name="Title 1"/>
+          <p:cNvSpPr txBox="1">
+            <a:spLocks/>
+          </p:cNvSpPr>
+          <p:nvPr/>
+        </p:nvSpPr>
+        <p:spPr>
+          <a:xfrm>
+            <a:off x="457200" y="14514"/>
+            <a:ext cx="8229600" cy="1143000"/>
+          </a:xfrm>
+          <a:prstGeom prst="rect">
+            <a:avLst/>
+          </a:prstGeom>
+        </p:spPr>
+        <p:txBody>
+          <a:bodyPr vert="horz" lIns="91440" tIns="45720" rIns="91440" bIns="45720" rtlCol="0" anchor="ctr">
+            <a:normAutofit fontScale="90000" lnSpcReduction="20000"/>
+          </a:bodyPr>
+          <a:lstStyle>
+            <a:lvl1pPr algn="ctr" defTabSz="914400" rtl="0" eaLnBrk="1" latinLnBrk="0" hangingPunct="1">
+              <a:spcBef>
+                <a:spcPct val="0"/>
+              </a:spcBef>
+              <a:buNone/>
+              <a:defRPr sz="4400" kern="1200">
+                <a:solidFill>
+                  <a:schemeClr val="tx1"/>
+                </a:solidFill>
+                <a:latin typeface="+mj-lt"/>
+                <a:ea typeface="+mj-ea"/>
+                <a:cs typeface="+mj-cs"/>
+              </a:defRPr>
+            </a:lvl1pPr>
+          </a:lstStyle>
+          <a:p>
+            <a:r>
+              <a:rPr lang="en-US" dirty="0" smtClean="0"/>
+              <a:t>MSE Comparisons Between Strains in the 14 Gene, 25 Edges CIN5 Network</a:t>
+            </a:r>
+            <a:endParaRPr lang="en-US" dirty="0"/>
           </a:p>
         </p:txBody>
       </p:sp>
     </p:spTree>
     <p:extLst>
       <p:ext uri="{BB962C8B-B14F-4D97-AF65-F5344CB8AC3E}">
-        <p14:creationId xmlns:p14="http://schemas.microsoft.com/office/powerpoint/2010/main" val="2213779648"/>
+        <p14:creationId xmlns:p14="http://schemas.microsoft.com/office/powerpoint/2010/main" val="3019459838"/>
       </p:ext>
     </p:extLst>
   </p:cSld>
   <p:clrMapOvr>
     <a:masterClrMapping/>
   </p:clrMapOvr>
+  <p:timing>
+    <p:tnLst>
+      <p:par>
+        <p:cTn xmlns:p14="http://schemas.microsoft.com/office/powerpoint/2010/main" id="1" dur="indefinite" restart="never" nodeType="tmRoot"/>
+      </p:par>
+    </p:tnLst>
+  </p:timing>
 </p:sld>
 </file>
 
@@ -11052,60 +10997,23 @@
           <a:chExt cx="0" cy="0"/>
         </a:xfrm>
       </p:grpSpPr>
-      <p:sp>
-        <p:nvSpPr>
-          <p:cNvPr id="2" name="Title 1"/>
-          <p:cNvSpPr>
-            <a:spLocks noGrp="1"/>
-          </p:cNvSpPr>
-          <p:nvPr>
-            <p:ph type="title"/>
-          </p:nvPr>
-        </p:nvSpPr>
-        <p:spPr>
-          <a:xfrm>
-            <a:off x="457200" y="14514"/>
-            <a:ext cx="8229600" cy="1143000"/>
-          </a:xfrm>
-        </p:spPr>
-        <p:txBody>
-          <a:bodyPr>
-            <a:normAutofit fontScale="90000"/>
-          </a:bodyPr>
-          <a:lstStyle/>
-          <a:p>
-            <a:r>
-              <a:rPr lang="en-US" dirty="0"/>
-              <a:t>MSE Comparisons Between Strains in the </a:t>
-            </a:r>
-            <a:r>
-              <a:rPr lang="en-US" dirty="0" smtClean="0"/>
-              <a:t>14 gene, 25 edges CIN5 </a:t>
-            </a:r>
-            <a:r>
-              <a:rPr lang="en-US" dirty="0"/>
-              <a:t>Network</a:t>
-            </a:r>
-          </a:p>
-        </p:txBody>
-      </p:sp>
       <p:graphicFrame>
         <p:nvGraphicFramePr>
-          <p:cNvPr id="4" name="Chart 3"/>
+          <p:cNvPr id="7" name="Chart 6"/>
           <p:cNvGraphicFramePr>
             <a:graphicFrameLocks/>
           </p:cNvGraphicFramePr>
           <p:nvPr>
             <p:extLst>
               <p:ext uri="{D42A27DB-BD31-4B8C-83A1-F6EECF244321}">
-                <p14:modId xmlns:p14="http://schemas.microsoft.com/office/powerpoint/2010/main" val="145876841"/>
+                <p14:modId xmlns:p14="http://schemas.microsoft.com/office/powerpoint/2010/main" val="1430597239"/>
               </p:ext>
             </p:extLst>
           </p:nvPr>
         </p:nvGraphicFramePr>
         <p:xfrm>
-          <a:off x="-10886" y="1150257"/>
-          <a:ext cx="9144000" cy="5715000"/>
+          <a:off x="14136" y="1066800"/>
+          <a:ext cx="9129864" cy="5791200"/>
         </p:xfrm>
         <a:graphic>
           <a:graphicData uri="http://schemas.openxmlformats.org/drawingml/2006/chart">
@@ -11115,14 +11023,14 @@
       </p:graphicFrame>
       <p:sp>
         <p:nvSpPr>
-          <p:cNvPr id="5" name="TextBox 4"/>
+          <p:cNvPr id="8" name="TextBox 7"/>
           <p:cNvSpPr txBox="1"/>
           <p:nvPr/>
         </p:nvSpPr>
         <p:spPr>
           <a:xfrm>
-            <a:off x="8001000" y="3124200"/>
-            <a:ext cx="990600" cy="307777"/>
+            <a:off x="8001000" y="3014990"/>
+            <a:ext cx="1014222" cy="261610"/>
           </a:xfrm>
           <a:prstGeom prst="rect">
             <a:avLst/>
@@ -11136,29 +11044,82 @@
           <a:lstStyle/>
           <a:p>
             <a:r>
-              <a:rPr lang="en-US" sz="1400" b="1" u="sng" dirty="0" smtClean="0">
+              <a:rPr lang="en-US" sz="1100" b="1" u="sng" dirty="0" smtClean="0">
                 <a:latin typeface="Arial"/>
                 <a:cs typeface="Arial"/>
               </a:rPr>
-              <a:t>Strain</a:t>
+              <a:t>Strain:</a:t>
             </a:r>
-            <a:endParaRPr lang="en-US" sz="1400" b="1" u="sng" dirty="0">
+            <a:endParaRPr lang="en-US" sz="1100" b="1" u="sng" dirty="0">
               <a:latin typeface="Arial"/>
               <a:cs typeface="Arial"/>
             </a:endParaRPr>
+          </a:p>
+        </p:txBody>
+      </p:sp>
+      <p:sp>
+        <p:nvSpPr>
+          <p:cNvPr id="6" name="Title 1"/>
+          <p:cNvSpPr txBox="1">
+            <a:spLocks/>
+          </p:cNvSpPr>
+          <p:nvPr/>
+        </p:nvSpPr>
+        <p:spPr>
+          <a:xfrm>
+            <a:off x="533400" y="0"/>
+            <a:ext cx="8229600" cy="1143000"/>
+          </a:xfrm>
+          <a:prstGeom prst="rect">
+            <a:avLst/>
+          </a:prstGeom>
+        </p:spPr>
+        <p:txBody>
+          <a:bodyPr vert="horz" lIns="91440" tIns="45720" rIns="91440" bIns="45720" rtlCol="0" anchor="ctr">
+            <a:normAutofit fontScale="90000" lnSpcReduction="20000"/>
+          </a:bodyPr>
+          <a:lstStyle>
+            <a:lvl1pPr algn="ctr" defTabSz="914400" rtl="0" eaLnBrk="1" latinLnBrk="0" hangingPunct="1">
+              <a:spcBef>
+                <a:spcPct val="0"/>
+              </a:spcBef>
+              <a:buNone/>
+              <a:defRPr sz="4400" kern="1200">
+                <a:solidFill>
+                  <a:schemeClr val="tx1"/>
+                </a:solidFill>
+                <a:latin typeface="+mj-lt"/>
+                <a:ea typeface="+mj-ea"/>
+                <a:cs typeface="+mj-cs"/>
+              </a:defRPr>
+            </a:lvl1pPr>
+          </a:lstStyle>
+          <a:p>
+            <a:r>
+              <a:rPr lang="en-US" dirty="0" smtClean="0"/>
+              <a:t>MSE Comparisons Between Strains in the 17 Gene, 32 Edge CIN5 Network</a:t>
+            </a:r>
+            <a:endParaRPr lang="en-US" dirty="0"/>
           </a:p>
         </p:txBody>
       </p:sp>
     </p:spTree>
     <p:extLst>
       <p:ext uri="{BB962C8B-B14F-4D97-AF65-F5344CB8AC3E}">
-        <p14:creationId xmlns:p14="http://schemas.microsoft.com/office/powerpoint/2010/main" val="1514992096"/>
+        <p14:creationId xmlns:p14="http://schemas.microsoft.com/office/powerpoint/2010/main" val="3019459838"/>
       </p:ext>
     </p:extLst>
   </p:cSld>
   <p:clrMapOvr>
     <a:masterClrMapping/>
   </p:clrMapOvr>
+  <p:timing>
+    <p:tnLst>
+      <p:par>
+        <p:cTn xmlns:p14="http://schemas.microsoft.com/office/powerpoint/2010/main" id="1" dur="indefinite" restart="never" nodeType="tmRoot"/>
+      </p:par>
+    </p:tnLst>
+  </p:timing>
 </p:sld>
 </file>
 

</xml_diff>